<commit_message>
updated powerpoint templates to a smaller text size to better accomodate longer titles
</commit_message>
<xml_diff>
--- a/src/main/resources/content/ppt-templates/design2.pptx
+++ b/src/main/resources/content/ppt-templates/design2.pptx
@@ -2,24 +2,24 @@
 <file path=ppt/presentation.xml><?xml version="1.0" encoding="utf-8"?>
 <p:presentation xmlns:a="http://schemas.openxmlformats.org/drawingml/2006/main" xmlns:r="http://schemas.openxmlformats.org/officeDocument/2006/relationships" xmlns:p="http://schemas.openxmlformats.org/presentationml/2006/main" showSpecialPlsOnTitleSld="0" removePersonalInfoOnSave="1" saveSubsetFonts="1" autoCompressPictures="0">
   <p:sldMasterIdLst>
-    <p:sldMasterId id="2147483732" r:id="rId1"/>
+    <p:sldMasterId id="2147483732" r:id="rId4"/>
   </p:sldMasterIdLst>
   <p:notesMasterIdLst>
-    <p:notesMasterId r:id="rId14"/>
+    <p:notesMasterId r:id="rId17"/>
   </p:notesMasterIdLst>
   <p:sldIdLst>
-    <p:sldId id="259" r:id="rId2"/>
-    <p:sldId id="260" r:id="rId3"/>
-    <p:sldId id="261" r:id="rId4"/>
-    <p:sldId id="258" r:id="rId5"/>
-    <p:sldId id="266" r:id="rId6"/>
-    <p:sldId id="268" r:id="rId7"/>
-    <p:sldId id="272" r:id="rId8"/>
-    <p:sldId id="271" r:id="rId9"/>
-    <p:sldId id="264" r:id="rId10"/>
-    <p:sldId id="265" r:id="rId11"/>
-    <p:sldId id="257" r:id="rId12"/>
-    <p:sldId id="267" r:id="rId13"/>
+    <p:sldId id="259" r:id="rId5"/>
+    <p:sldId id="260" r:id="rId6"/>
+    <p:sldId id="261" r:id="rId7"/>
+    <p:sldId id="258" r:id="rId8"/>
+    <p:sldId id="266" r:id="rId9"/>
+    <p:sldId id="268" r:id="rId10"/>
+    <p:sldId id="272" r:id="rId11"/>
+    <p:sldId id="271" r:id="rId12"/>
+    <p:sldId id="264" r:id="rId13"/>
+    <p:sldId id="265" r:id="rId14"/>
+    <p:sldId id="257" r:id="rId15"/>
+    <p:sldId id="267" r:id="rId16"/>
   </p:sldIdLst>
   <p:sldSz cx="12192000" cy="6858000"/>
   <p:notesSz cx="6858000" cy="9144000"/>
@@ -129,7 +129,7 @@
 </p:presentation>
 </file>
 
-<file path=ppt/diagrams/colors11.xml><?xml version="1.0" encoding="utf-8"?>
+<file path=ppt/diagrams/colors1.xml><?xml version="1.0" encoding="utf-8"?>
 <dgm:colorsDef xmlns:dgm="http://schemas.openxmlformats.org/drawingml/2006/diagram" xmlns:a="http://schemas.openxmlformats.org/drawingml/2006/main" uniqueId="urn:microsoft.com/office/officeart/2005/8/colors/colorful5">
   <dgm:title val=""/>
   <dgm:desc val=""/>
@@ -911,7 +911,7 @@
 </dgm:colorsDef>
 </file>
 
-<file path=ppt/diagrams/data11.xml><?xml version="1.0" encoding="utf-8"?>
+<file path=ppt/diagrams/data1.xml><?xml version="1.0" encoding="utf-8"?>
 <dgm:dataModel xmlns:dgm="http://schemas.openxmlformats.org/drawingml/2006/diagram" xmlns:a="http://schemas.openxmlformats.org/drawingml/2006/main">
   <dgm:ptLst>
     <dgm:pt modelId="{013DD35D-9765-4E5F-95CE-DA45F3637BF5}" type="doc">
@@ -1622,8 +1622,8 @@
     <dgm:cxn modelId="{EBCB5D36-831A-4B97-8581-6B725E361406}" type="presOf" srcId="{3F378E98-4217-47A9-8134-DE6C3ABFE041}" destId="{381C85ED-02C3-43BB-AB7D-DF18967DB45A}" srcOrd="0" destOrd="0" presId="urn:microsoft.com/office/officeart/2016/7/layout/RoundedRectangleTimeline#2"/>
     <dgm:cxn modelId="{4B9D1B38-B15E-439C-A447-4C5E9F3A123B}" srcId="{826806C1-9610-4710-B423-647F50DE2422}" destId="{638B9804-CCCF-4EB6-A4DE-E4329D75D8A0}" srcOrd="0" destOrd="0" parTransId="{022B26EF-8A54-4991-AEC7-4531517F16A2}" sibTransId="{2CBCCE5F-A674-4AEE-8A17-3CDF27A39FD7}"/>
     <dgm:cxn modelId="{F8300039-5DA9-449F-B747-D0062435C4E8}" type="presOf" srcId="{826806C1-9610-4710-B423-647F50DE2422}" destId="{30526F0C-E541-4005-AF10-52591D76F7C6}" srcOrd="0" destOrd="0" presId="urn:microsoft.com/office/officeart/2016/7/layout/RoundedRectangleTimeline#2"/>
+    <dgm:cxn modelId="{711C1C47-1ACD-4CF6-94A3-A65870CD9388}" type="presOf" srcId="{0AFF4C1B-302C-42EF-B59F-97CDC2799D17}" destId="{AB0282E3-1216-4CDB-AC5F-106C1EEEB95A}" srcOrd="0" destOrd="0" presId="urn:microsoft.com/office/officeart/2016/7/layout/RoundedRectangleTimeline#2"/>
     <dgm:cxn modelId="{C23B5F60-F074-45B8-BB09-18AD4152539D}" srcId="{8F3B4B19-33F4-47AC-BE4E-B66181ED98B4}" destId="{0AFF4C1B-302C-42EF-B59F-97CDC2799D17}" srcOrd="0" destOrd="0" parTransId="{0EBE8459-BB53-4FEB-9003-4D3795F4559C}" sibTransId="{6755B5A7-26F9-4D2F-8EA9-DCC4A05B07D9}"/>
-    <dgm:cxn modelId="{711C1C47-1ACD-4CF6-94A3-A65870CD9388}" type="presOf" srcId="{0AFF4C1B-302C-42EF-B59F-97CDC2799D17}" destId="{AB0282E3-1216-4CDB-AC5F-106C1EEEB95A}" srcOrd="0" destOrd="0" presId="urn:microsoft.com/office/officeart/2016/7/layout/RoundedRectangleTimeline#2"/>
     <dgm:cxn modelId="{DDCA306A-CAE5-467C-99CE-41ADCAA7344E}" type="presOf" srcId="{638B9804-CCCF-4EB6-A4DE-E4329D75D8A0}" destId="{F48F76A8-076C-4476-B2C2-A2B4460F7964}" srcOrd="0" destOrd="0" presId="urn:microsoft.com/office/officeart/2016/7/layout/RoundedRectangleTimeline#2"/>
     <dgm:cxn modelId="{21261374-9143-4E6D-8DCE-83DDD5AC4B67}" type="presOf" srcId="{013DD35D-9765-4E5F-95CE-DA45F3637BF5}" destId="{FE888CE1-9F15-40DF-9718-C8B432B3BB83}" srcOrd="0" destOrd="0" presId="urn:microsoft.com/office/officeart/2016/7/layout/RoundedRectangleTimeline#2"/>
     <dgm:cxn modelId="{E01FE584-0925-4BC0-9383-A1E85DE458FD}" srcId="{013DD35D-9765-4E5F-95CE-DA45F3637BF5}" destId="{25E771E7-8CF7-4491-9507-55BFE693DC7B}" srcOrd="0" destOrd="0" parTransId="{D34FC0B2-1D9D-47C1-B680-27EF2E97D428}" sibTransId="{B3CFB133-9C4F-4A0A-888D-0CEC78FFDFFC}"/>
@@ -2837,7 +2837,7 @@
 </dsp:drawing>
 </file>
 
-<file path=ppt/diagrams/layout11.xml><?xml version="1.0" encoding="utf-8"?>
+<file path=ppt/diagrams/layout1.xml><?xml version="1.0" encoding="utf-8"?>
 <dgm:layoutDef xmlns:dgm="http://schemas.openxmlformats.org/drawingml/2006/diagram" xmlns:a="http://schemas.openxmlformats.org/drawingml/2006/main" uniqueId="urn:microsoft.com/office/officeart/2016/7/layout/RoundedRectangleTimeline#2">
   <dgm:title val="Rounded Rectangle Timeline"/>
   <dgm:desc val="Use to show a list of events in chronological order. An invisible box contains the description while the date is shown in rectangles, except for the first and last node where the corners of the rectangle are rounded. It can display large amount of text and long descriptive date format."/>
@@ -3264,7 +3264,7 @@
 </dgm:layoutDef>
 </file>
 
-<file path=ppt/diagrams/quickStyle11.xml><?xml version="1.0" encoding="utf-8"?>
+<file path=ppt/diagrams/quickStyle1.xml><?xml version="1.0" encoding="utf-8"?>
 <dgm:styleDef xmlns:dgm="http://schemas.openxmlformats.org/drawingml/2006/diagram" xmlns:a="http://schemas.openxmlformats.org/drawingml/2006/main" uniqueId="urn:microsoft.com/office/officeart/2005/8/quickstyle/simple1">
   <dgm:title val=""/>
   <dgm:desc val=""/>
@@ -4298,7 +4298,7 @@
 </dgm:styleDef>
 </file>
 
-<file path=ppt/notesMasters/notesMaster11.xml><?xml version="1.0" encoding="utf-8"?>
+<file path=ppt/notesMasters/notesMaster1.xml><?xml version="1.0" encoding="utf-8"?>
 <p:notesMaster xmlns:a="http://schemas.openxmlformats.org/drawingml/2006/main" xmlns:r="http://schemas.openxmlformats.org/officeDocument/2006/relationships" xmlns:p="http://schemas.openxmlformats.org/presentationml/2006/main">
   <p:cSld>
     <p:bg>
@@ -4380,7 +4380,7 @@
           <a:p>
             <a:fld id="{3B061595-59EE-46FE-9AD4-893BD3CF30D8}" type="datetimeFigureOut">
               <a:rPr lang="en-US" smtClean="0"/>
-              <a:t>5/26/2021</a:t>
+              <a:t>7/31/23</a:t>
             </a:fld>
             <a:endParaRPr lang="en-US" dirty="0"/>
           </a:p>
@@ -4647,452 +4647,7 @@
 </p:notesMaster>
 </file>
 
-<file path=ppt/slideLayouts/slideLayout1014.xml><?xml version="1.0" encoding="utf-8"?>
-<p:sldLayout xmlns:a="http://schemas.openxmlformats.org/drawingml/2006/main" xmlns:r="http://schemas.openxmlformats.org/officeDocument/2006/relationships" xmlns:p="http://schemas.openxmlformats.org/presentationml/2006/main" showMasterSp="0" preserve="1" userDrawn="1">
-  <p:cSld name="Summary">
-    <p:spTree>
-      <p:nvGrpSpPr>
-        <p:cNvPr id="1" name=""/>
-        <p:cNvGrpSpPr/>
-        <p:nvPr/>
-      </p:nvGrpSpPr>
-      <p:grpSpPr>
-        <a:xfrm>
-          <a:off x="0" y="0"/>
-          <a:ext cx="0" cy="0"/>
-          <a:chOff x="0" y="0"/>
-          <a:chExt cx="0" cy="0"/>
-        </a:xfrm>
-      </p:grpSpPr>
-      <p:sp>
-        <p:nvSpPr>
-          <p:cNvPr id="22" name="Rectangle 21">
-            <a:extLst>
-              <a:ext uri="{FF2B5EF4-FFF2-40B4-BE49-F238E27FC236}">
-                <a16:creationId xmlns:a16="http://schemas.microsoft.com/office/drawing/2014/main" id="{CE62CE4B-3BFB-4501-B59A-0ED68CF6127A}"/>
-              </a:ext>
-              <a:ext uri="{C183D7F6-B498-43B3-948B-1728B52AA6E4}">
-                <adec:decorative xmlns:adec="http://schemas.microsoft.com/office/drawing/2017/decorative" val="1"/>
-              </a:ext>
-            </a:extLst>
-          </p:cNvPr>
-          <p:cNvSpPr/>
-          <p:nvPr userDrawn="1"/>
-        </p:nvSpPr>
-        <p:spPr>
-          <a:xfrm>
-            <a:off x="0" y="0"/>
-            <a:ext cx="12188952" cy="6858000"/>
-          </a:xfrm>
-          <a:prstGeom prst="rect">
-            <a:avLst/>
-          </a:prstGeom>
-          <a:solidFill>
-            <a:schemeClr val="bg2">
-              <a:lumMod val="90000"/>
-              <a:alpha val="70000"/>
-            </a:schemeClr>
-          </a:solidFill>
-          <a:ln>
-            <a:noFill/>
-          </a:ln>
-        </p:spPr>
-        <p:style>
-          <a:lnRef idx="2">
-            <a:schemeClr val="accent1">
-              <a:shade val="50000"/>
-            </a:schemeClr>
-          </a:lnRef>
-          <a:fillRef idx="1">
-            <a:schemeClr val="accent1"/>
-          </a:fillRef>
-          <a:effectRef idx="0">
-            <a:schemeClr val="accent1"/>
-          </a:effectRef>
-          <a:fontRef idx="minor">
-            <a:schemeClr val="lt1"/>
-          </a:fontRef>
-        </p:style>
-        <p:txBody>
-          <a:bodyPr rtlCol="0" anchor="ctr"/>
-          <a:lstStyle/>
-          <a:p>
-            <a:pPr algn="ctr"/>
-            <a:endParaRPr lang="en-US" dirty="0">
-              <a:solidFill>
-                <a:schemeClr val="tx1">
-                  <a:lumMod val="65000"/>
-                  <a:lumOff val="35000"/>
-                </a:schemeClr>
-              </a:solidFill>
-              <a:latin typeface="AvenirNext LT Pro Medium" panose="020B0504020202020204" pitchFamily="34" charset="0"/>
-            </a:endParaRPr>
-          </a:p>
-        </p:txBody>
-      </p:sp>
-      <p:sp>
-        <p:nvSpPr>
-          <p:cNvPr id="14" name="Title 1">
-            <a:extLst>
-              <a:ext uri="{FF2B5EF4-FFF2-40B4-BE49-F238E27FC236}">
-                <a16:creationId xmlns:a16="http://schemas.microsoft.com/office/drawing/2014/main" id="{DF608493-BDCD-43BD-A3CC-24E7502763F3}"/>
-              </a:ext>
-            </a:extLst>
-          </p:cNvPr>
-          <p:cNvSpPr>
-            <a:spLocks noGrp="1"/>
-          </p:cNvSpPr>
-          <p:nvPr>
-            <p:ph type="title"/>
-          </p:nvPr>
-        </p:nvSpPr>
-        <p:spPr>
-          <a:xfrm>
-            <a:off x="838200" y="393192"/>
-            <a:ext cx="4524956" cy="2130552"/>
-          </a:xfrm>
-        </p:spPr>
-        <p:txBody>
-          <a:bodyPr>
-            <a:noAutofit/>
-          </a:bodyPr>
-          <a:lstStyle/>
-          <a:p>
-            <a:pPr>
-              <a:lnSpc>
-                <a:spcPct val="100000"/>
-              </a:lnSpc>
-            </a:pPr>
-            <a:endParaRPr lang="en-US" spc="120" dirty="0">
-              <a:cs typeface="Posterama" panose="020B0504020200020000" pitchFamily="34" charset="0"/>
-            </a:endParaRPr>
-          </a:p>
-        </p:txBody>
-      </p:sp>
-      <p:sp>
-        <p:nvSpPr>
-          <p:cNvPr id="15" name="Content Placeholder 2">
-            <a:extLst>
-              <a:ext uri="{FF2B5EF4-FFF2-40B4-BE49-F238E27FC236}">
-                <a16:creationId xmlns:a16="http://schemas.microsoft.com/office/drawing/2014/main" id="{F3B9F353-002B-4A4D-A316-70D952EDAE7E}"/>
-              </a:ext>
-            </a:extLst>
-          </p:cNvPr>
-          <p:cNvSpPr>
-            <a:spLocks noGrp="1"/>
-          </p:cNvSpPr>
-          <p:nvPr>
-            <p:ph idx="1"/>
-          </p:nvPr>
-        </p:nvSpPr>
-        <p:spPr>
-          <a:xfrm>
-            <a:off x="838200" y="2727297"/>
-            <a:ext cx="4524664" cy="3412969"/>
-          </a:xfrm>
-        </p:spPr>
-        <p:txBody>
-          <a:bodyPr anchor="ctr" anchorCtr="0">
-            <a:normAutofit/>
-          </a:bodyPr>
-          <a:lstStyle>
-            <a:lvl1pPr marL="0" indent="0">
-              <a:lnSpc>
-                <a:spcPct val="100000"/>
-              </a:lnSpc>
-              <a:buNone/>
-              <a:defRPr sz="1800"/>
-            </a:lvl1pPr>
-          </a:lstStyle>
-          <a:p>
-            <a:pPr>
-              <a:lnSpc>
-                <a:spcPct val="110000"/>
-              </a:lnSpc>
-            </a:pPr>
-            <a:endParaRPr lang="en-US" sz="1800" dirty="0"/>
-          </a:p>
-        </p:txBody>
-      </p:sp>
-      <p:pic>
-        <p:nvPicPr>
-          <p:cNvPr id="16" name="Picture 15">
-            <a:extLst>
-              <a:ext uri="{FF2B5EF4-FFF2-40B4-BE49-F238E27FC236}">
-                <a16:creationId xmlns:a16="http://schemas.microsoft.com/office/drawing/2014/main" id="{F9890B2B-FFC6-4C7C-A617-67144F1E3C51}"/>
-              </a:ext>
-              <a:ext uri="{C183D7F6-B498-43B3-948B-1728B52AA6E4}">
-                <adec:decorative xmlns:adec="http://schemas.microsoft.com/office/drawing/2017/decorative" val="1"/>
-              </a:ext>
-            </a:extLst>
-          </p:cNvPr>
-          <p:cNvPicPr>
-            <a:picLocks noChangeAspect="1"/>
-          </p:cNvPicPr>
-          <p:nvPr userDrawn="1"/>
-        </p:nvPicPr>
-        <p:blipFill>
-          <a:blip r:embed="rId2">
-            <a:duotone>
-              <a:schemeClr val="accent6">
-                <a:shade val="45000"/>
-                <a:satMod val="135000"/>
-              </a:schemeClr>
-              <a:prstClr val="white"/>
-            </a:duotone>
-            <a:alphaModFix amt="15000"/>
-            <a:extLst>
-              <a:ext uri="{28A0092B-C50C-407E-A947-70E740481C1C}">
-                <a14:useLocalDpi xmlns:a14="http://schemas.microsoft.com/office/drawing/2010/main" val="0"/>
-              </a:ext>
-            </a:extLst>
-          </a:blip>
-          <a:stretch>
-            <a:fillRect/>
-          </a:stretch>
-        </p:blipFill>
-        <p:spPr>
-          <a:xfrm>
-            <a:off x="7073255" y="0"/>
-            <a:ext cx="5115697" cy="6858000"/>
-          </a:xfrm>
-          <a:prstGeom prst="rect">
-            <a:avLst/>
-          </a:prstGeom>
-        </p:spPr>
-      </p:pic>
-      <p:sp>
-        <p:nvSpPr>
-          <p:cNvPr id="24" name="Picture Placeholder 23">
-            <a:extLst>
-              <a:ext uri="{FF2B5EF4-FFF2-40B4-BE49-F238E27FC236}">
-                <a16:creationId xmlns:a16="http://schemas.microsoft.com/office/drawing/2014/main" id="{8CD8768C-8806-4DE0-82CC-275A2EC6D47D}"/>
-              </a:ext>
-            </a:extLst>
-          </p:cNvPr>
-          <p:cNvSpPr>
-            <a:spLocks noGrp="1"/>
-          </p:cNvSpPr>
-          <p:nvPr>
-            <p:ph type="pic" sz="quarter" idx="13"/>
-          </p:nvPr>
-        </p:nvSpPr>
-        <p:spPr>
-          <a:xfrm>
-            <a:off x="5879592" y="740664"/>
-            <a:ext cx="2798762" cy="2606040"/>
-          </a:xfrm>
-          <a:solidFill>
-            <a:schemeClr val="accent6"/>
-          </a:solidFill>
-        </p:spPr>
-        <p:txBody>
-          <a:bodyPr/>
-          <a:lstStyle/>
-          <a:p>
-            <a:endParaRPr lang="en-US" dirty="0"/>
-          </a:p>
-        </p:txBody>
-      </p:sp>
-      <p:sp>
-        <p:nvSpPr>
-          <p:cNvPr id="25" name="Picture Placeholder 23">
-            <a:extLst>
-              <a:ext uri="{FF2B5EF4-FFF2-40B4-BE49-F238E27FC236}">
-                <a16:creationId xmlns:a16="http://schemas.microsoft.com/office/drawing/2014/main" id="{68CB9DF9-86EB-48CF-B212-F2B290C56FFF}"/>
-              </a:ext>
-            </a:extLst>
-          </p:cNvPr>
-          <p:cNvSpPr>
-            <a:spLocks noGrp="1"/>
-          </p:cNvSpPr>
-          <p:nvPr>
-            <p:ph type="pic" sz="quarter" idx="14"/>
-          </p:nvPr>
-        </p:nvSpPr>
-        <p:spPr>
-          <a:xfrm>
-            <a:off x="8878824" y="740664"/>
-            <a:ext cx="2798762" cy="2606040"/>
-          </a:xfrm>
-          <a:solidFill>
-            <a:schemeClr val="accent6"/>
-          </a:solidFill>
-        </p:spPr>
-        <p:txBody>
-          <a:bodyPr/>
-          <a:lstStyle/>
-          <a:p>
-            <a:endParaRPr lang="en-US" dirty="0"/>
-          </a:p>
-        </p:txBody>
-      </p:sp>
-      <p:sp>
-        <p:nvSpPr>
-          <p:cNvPr id="26" name="Picture Placeholder 23">
-            <a:extLst>
-              <a:ext uri="{FF2B5EF4-FFF2-40B4-BE49-F238E27FC236}">
-                <a16:creationId xmlns:a16="http://schemas.microsoft.com/office/drawing/2014/main" id="{554B2207-3993-41B6-AF63-EBB48DACAB8F}"/>
-              </a:ext>
-            </a:extLst>
-          </p:cNvPr>
-          <p:cNvSpPr>
-            <a:spLocks noGrp="1"/>
-          </p:cNvSpPr>
-          <p:nvPr>
-            <p:ph type="pic" sz="quarter" idx="15"/>
-          </p:nvPr>
-        </p:nvSpPr>
-        <p:spPr>
-          <a:xfrm>
-            <a:off x="5879592" y="3529584"/>
-            <a:ext cx="2798762" cy="2606040"/>
-          </a:xfrm>
-          <a:solidFill>
-            <a:schemeClr val="accent6"/>
-          </a:solidFill>
-        </p:spPr>
-        <p:txBody>
-          <a:bodyPr/>
-          <a:lstStyle/>
-          <a:p>
-            <a:endParaRPr lang="en-US" dirty="0"/>
-          </a:p>
-        </p:txBody>
-      </p:sp>
-      <p:sp>
-        <p:nvSpPr>
-          <p:cNvPr id="27" name="Picture Placeholder 23">
-            <a:extLst>
-              <a:ext uri="{FF2B5EF4-FFF2-40B4-BE49-F238E27FC236}">
-                <a16:creationId xmlns:a16="http://schemas.microsoft.com/office/drawing/2014/main" id="{DE0340D8-BC7E-4431-A7A7-8D634C8A19F6}"/>
-              </a:ext>
-            </a:extLst>
-          </p:cNvPr>
-          <p:cNvSpPr>
-            <a:spLocks noGrp="1"/>
-          </p:cNvSpPr>
-          <p:nvPr>
-            <p:ph type="pic" sz="quarter" idx="16"/>
-          </p:nvPr>
-        </p:nvSpPr>
-        <p:spPr>
-          <a:xfrm>
-            <a:off x="8869680" y="3529584"/>
-            <a:ext cx="2798762" cy="2606040"/>
-          </a:xfrm>
-          <a:solidFill>
-            <a:schemeClr val="accent6"/>
-          </a:solidFill>
-        </p:spPr>
-        <p:txBody>
-          <a:bodyPr/>
-          <a:lstStyle/>
-          <a:p>
-            <a:endParaRPr lang="en-US" dirty="0"/>
-          </a:p>
-        </p:txBody>
-      </p:sp>
-      <p:sp>
-        <p:nvSpPr>
-          <p:cNvPr id="2" name="Date Placeholder 1">
-            <a:extLst>
-              <a:ext uri="{FF2B5EF4-FFF2-40B4-BE49-F238E27FC236}">
-                <a16:creationId xmlns:a16="http://schemas.microsoft.com/office/drawing/2014/main" id="{72933BE2-665A-42DA-A3B7-835F81A3F46B}"/>
-              </a:ext>
-            </a:extLst>
-          </p:cNvPr>
-          <p:cNvSpPr>
-            <a:spLocks noGrp="1"/>
-          </p:cNvSpPr>
-          <p:nvPr>
-            <p:ph type="dt" sz="half" idx="10"/>
-          </p:nvPr>
-        </p:nvSpPr>
-        <p:spPr/>
-        <p:txBody>
-          <a:bodyPr/>
-          <a:lstStyle/>
-          <a:p>
-            <a:r>
-              <a:rPr lang="en-US"/>
-              <a:t>20XX</a:t>
-            </a:r>
-            <a:endParaRPr lang="en-US" dirty="0"/>
-          </a:p>
-        </p:txBody>
-      </p:sp>
-      <p:sp>
-        <p:nvSpPr>
-          <p:cNvPr id="3" name="Footer Placeholder 2">
-            <a:extLst>
-              <a:ext uri="{FF2B5EF4-FFF2-40B4-BE49-F238E27FC236}">
-                <a16:creationId xmlns:a16="http://schemas.microsoft.com/office/drawing/2014/main" id="{634DBCBD-AD42-432D-ABA9-20D616AF3ED7}"/>
-              </a:ext>
-            </a:extLst>
-          </p:cNvPr>
-          <p:cNvSpPr>
-            <a:spLocks noGrp="1"/>
-          </p:cNvSpPr>
-          <p:nvPr>
-            <p:ph type="ftr" sz="quarter" idx="11"/>
-          </p:nvPr>
-        </p:nvSpPr>
-        <p:spPr/>
-        <p:txBody>
-          <a:bodyPr/>
-          <a:lstStyle/>
-          <a:p>
-            <a:r>
-              <a:rPr lang="en-US" dirty="0"/>
-              <a:t>Sample Footer Text</a:t>
-            </a:r>
-          </a:p>
-        </p:txBody>
-      </p:sp>
-      <p:sp>
-        <p:nvSpPr>
-          <p:cNvPr id="4" name="Slide Number Placeholder 3">
-            <a:extLst>
-              <a:ext uri="{FF2B5EF4-FFF2-40B4-BE49-F238E27FC236}">
-                <a16:creationId xmlns:a16="http://schemas.microsoft.com/office/drawing/2014/main" id="{EE140251-3596-4673-B24B-59A6F9ED8FB3}"/>
-              </a:ext>
-            </a:extLst>
-          </p:cNvPr>
-          <p:cNvSpPr>
-            <a:spLocks noGrp="1"/>
-          </p:cNvSpPr>
-          <p:nvPr>
-            <p:ph type="sldNum" sz="quarter" idx="12"/>
-          </p:nvPr>
-        </p:nvSpPr>
-        <p:spPr/>
-        <p:txBody>
-          <a:bodyPr/>
-          <a:lstStyle/>
-          <a:p>
-            <a:fld id="{73B850FF-6169-4056-8077-06FFA93A5366}" type="slidenum">
-              <a:rPr lang="en-US" smtClean="0"/>
-              <a:t>‹#›</a:t>
-            </a:fld>
-            <a:endParaRPr lang="en-US" dirty="0"/>
-          </a:p>
-        </p:txBody>
-      </p:sp>
-    </p:spTree>
-    <p:extLst>
-      <p:ext uri="{BB962C8B-B14F-4D97-AF65-F5344CB8AC3E}">
-        <p14:creationId xmlns:p14="http://schemas.microsoft.com/office/powerpoint/2010/main" val="2958411415"/>
-      </p:ext>
-    </p:extLst>
-  </p:cSld>
-  <p:clrMapOvr>
-    <a:masterClrMapping/>
-  </p:clrMapOvr>
-</p:sldLayout>
-</file>
-
-<file path=ppt/slideLayouts/slideLayout110.xml><?xml version="1.0" encoding="utf-8"?>
+<file path=ppt/slideLayouts/slideLayout1.xml><?xml version="1.0" encoding="utf-8"?>
 <p:sldLayout xmlns:a="http://schemas.openxmlformats.org/drawingml/2006/main" xmlns:r="http://schemas.openxmlformats.org/officeDocument/2006/relationships" xmlns:p="http://schemas.openxmlformats.org/presentationml/2006/main" showMasterSp="0" preserve="1" userDrawn="1">
   <p:cSld name="Title">
     <p:spTree>
@@ -5379,7 +4934,11 @@
           <a:bodyPr anchor="b">
             <a:normAutofit/>
           </a:bodyPr>
-          <a:lstStyle/>
+          <a:lstStyle>
+            <a:lvl1pPr>
+              <a:defRPr sz="4800"/>
+            </a:lvl1pPr>
+          </a:lstStyle>
           <a:p>
             <a:pPr algn="l">
               <a:lnSpc>
@@ -5480,7 +5039,452 @@
 </p:sldLayout>
 </file>
 
-<file path=ppt/slideLayouts/slideLayout1111.xml><?xml version="1.0" encoding="utf-8"?>
+<file path=ppt/slideLayouts/slideLayout10.xml><?xml version="1.0" encoding="utf-8"?>
+<p:sldLayout xmlns:a="http://schemas.openxmlformats.org/drawingml/2006/main" xmlns:r="http://schemas.openxmlformats.org/officeDocument/2006/relationships" xmlns:p="http://schemas.openxmlformats.org/presentationml/2006/main" showMasterSp="0" preserve="1" userDrawn="1">
+  <p:cSld name="Summary">
+    <p:spTree>
+      <p:nvGrpSpPr>
+        <p:cNvPr id="1" name=""/>
+        <p:cNvGrpSpPr/>
+        <p:nvPr/>
+      </p:nvGrpSpPr>
+      <p:grpSpPr>
+        <a:xfrm>
+          <a:off x="0" y="0"/>
+          <a:ext cx="0" cy="0"/>
+          <a:chOff x="0" y="0"/>
+          <a:chExt cx="0" cy="0"/>
+        </a:xfrm>
+      </p:grpSpPr>
+      <p:sp>
+        <p:nvSpPr>
+          <p:cNvPr id="22" name="Rectangle 21">
+            <a:extLst>
+              <a:ext uri="{FF2B5EF4-FFF2-40B4-BE49-F238E27FC236}">
+                <a16:creationId xmlns:a16="http://schemas.microsoft.com/office/drawing/2014/main" id="{CE62CE4B-3BFB-4501-B59A-0ED68CF6127A}"/>
+              </a:ext>
+              <a:ext uri="{C183D7F6-B498-43B3-948B-1728B52AA6E4}">
+                <adec:decorative xmlns:adec="http://schemas.microsoft.com/office/drawing/2017/decorative" val="1"/>
+              </a:ext>
+            </a:extLst>
+          </p:cNvPr>
+          <p:cNvSpPr/>
+          <p:nvPr userDrawn="1"/>
+        </p:nvSpPr>
+        <p:spPr>
+          <a:xfrm>
+            <a:off x="0" y="0"/>
+            <a:ext cx="12188952" cy="6858000"/>
+          </a:xfrm>
+          <a:prstGeom prst="rect">
+            <a:avLst/>
+          </a:prstGeom>
+          <a:solidFill>
+            <a:schemeClr val="bg2">
+              <a:lumMod val="90000"/>
+              <a:alpha val="70000"/>
+            </a:schemeClr>
+          </a:solidFill>
+          <a:ln>
+            <a:noFill/>
+          </a:ln>
+        </p:spPr>
+        <p:style>
+          <a:lnRef idx="2">
+            <a:schemeClr val="accent1">
+              <a:shade val="50000"/>
+            </a:schemeClr>
+          </a:lnRef>
+          <a:fillRef idx="1">
+            <a:schemeClr val="accent1"/>
+          </a:fillRef>
+          <a:effectRef idx="0">
+            <a:schemeClr val="accent1"/>
+          </a:effectRef>
+          <a:fontRef idx="minor">
+            <a:schemeClr val="lt1"/>
+          </a:fontRef>
+        </p:style>
+        <p:txBody>
+          <a:bodyPr rtlCol="0" anchor="ctr"/>
+          <a:lstStyle/>
+          <a:p>
+            <a:pPr algn="ctr"/>
+            <a:endParaRPr lang="en-US" dirty="0">
+              <a:solidFill>
+                <a:schemeClr val="tx1">
+                  <a:lumMod val="65000"/>
+                  <a:lumOff val="35000"/>
+                </a:schemeClr>
+              </a:solidFill>
+              <a:latin typeface="AvenirNext LT Pro Medium" panose="020B0504020202020204" pitchFamily="34" charset="0"/>
+            </a:endParaRPr>
+          </a:p>
+        </p:txBody>
+      </p:sp>
+      <p:sp>
+        <p:nvSpPr>
+          <p:cNvPr id="14" name="Title 1">
+            <a:extLst>
+              <a:ext uri="{FF2B5EF4-FFF2-40B4-BE49-F238E27FC236}">
+                <a16:creationId xmlns:a16="http://schemas.microsoft.com/office/drawing/2014/main" id="{DF608493-BDCD-43BD-A3CC-24E7502763F3}"/>
+              </a:ext>
+            </a:extLst>
+          </p:cNvPr>
+          <p:cNvSpPr>
+            <a:spLocks noGrp="1"/>
+          </p:cNvSpPr>
+          <p:nvPr>
+            <p:ph type="title"/>
+          </p:nvPr>
+        </p:nvSpPr>
+        <p:spPr>
+          <a:xfrm>
+            <a:off x="838200" y="393192"/>
+            <a:ext cx="4524956" cy="2130552"/>
+          </a:xfrm>
+        </p:spPr>
+        <p:txBody>
+          <a:bodyPr>
+            <a:noAutofit/>
+          </a:bodyPr>
+          <a:lstStyle/>
+          <a:p>
+            <a:pPr>
+              <a:lnSpc>
+                <a:spcPct val="100000"/>
+              </a:lnSpc>
+            </a:pPr>
+            <a:endParaRPr lang="en-US" spc="120" dirty="0">
+              <a:cs typeface="Posterama" panose="020B0504020200020000" pitchFamily="34" charset="0"/>
+            </a:endParaRPr>
+          </a:p>
+        </p:txBody>
+      </p:sp>
+      <p:sp>
+        <p:nvSpPr>
+          <p:cNvPr id="15" name="Content Placeholder 2">
+            <a:extLst>
+              <a:ext uri="{FF2B5EF4-FFF2-40B4-BE49-F238E27FC236}">
+                <a16:creationId xmlns:a16="http://schemas.microsoft.com/office/drawing/2014/main" id="{F3B9F353-002B-4A4D-A316-70D952EDAE7E}"/>
+              </a:ext>
+            </a:extLst>
+          </p:cNvPr>
+          <p:cNvSpPr>
+            <a:spLocks noGrp="1"/>
+          </p:cNvSpPr>
+          <p:nvPr>
+            <p:ph idx="1"/>
+          </p:nvPr>
+        </p:nvSpPr>
+        <p:spPr>
+          <a:xfrm>
+            <a:off x="838200" y="2727297"/>
+            <a:ext cx="4524664" cy="3412969"/>
+          </a:xfrm>
+        </p:spPr>
+        <p:txBody>
+          <a:bodyPr anchor="ctr" anchorCtr="0">
+            <a:normAutofit/>
+          </a:bodyPr>
+          <a:lstStyle>
+            <a:lvl1pPr marL="0" indent="0">
+              <a:lnSpc>
+                <a:spcPct val="100000"/>
+              </a:lnSpc>
+              <a:buNone/>
+              <a:defRPr sz="1800"/>
+            </a:lvl1pPr>
+          </a:lstStyle>
+          <a:p>
+            <a:pPr>
+              <a:lnSpc>
+                <a:spcPct val="110000"/>
+              </a:lnSpc>
+            </a:pPr>
+            <a:endParaRPr lang="en-US" sz="1800" dirty="0"/>
+          </a:p>
+        </p:txBody>
+      </p:sp>
+      <p:pic>
+        <p:nvPicPr>
+          <p:cNvPr id="16" name="Picture 15">
+            <a:extLst>
+              <a:ext uri="{FF2B5EF4-FFF2-40B4-BE49-F238E27FC236}">
+                <a16:creationId xmlns:a16="http://schemas.microsoft.com/office/drawing/2014/main" id="{F9890B2B-FFC6-4C7C-A617-67144F1E3C51}"/>
+              </a:ext>
+              <a:ext uri="{C183D7F6-B498-43B3-948B-1728B52AA6E4}">
+                <adec:decorative xmlns:adec="http://schemas.microsoft.com/office/drawing/2017/decorative" val="1"/>
+              </a:ext>
+            </a:extLst>
+          </p:cNvPr>
+          <p:cNvPicPr>
+            <a:picLocks noChangeAspect="1"/>
+          </p:cNvPicPr>
+          <p:nvPr userDrawn="1"/>
+        </p:nvPicPr>
+        <p:blipFill>
+          <a:blip r:embed="rId2">
+            <a:duotone>
+              <a:schemeClr val="accent6">
+                <a:shade val="45000"/>
+                <a:satMod val="135000"/>
+              </a:schemeClr>
+              <a:prstClr val="white"/>
+            </a:duotone>
+            <a:alphaModFix amt="15000"/>
+            <a:extLst>
+              <a:ext uri="{28A0092B-C50C-407E-A947-70E740481C1C}">
+                <a14:useLocalDpi xmlns:a14="http://schemas.microsoft.com/office/drawing/2010/main" val="0"/>
+              </a:ext>
+            </a:extLst>
+          </a:blip>
+          <a:stretch>
+            <a:fillRect/>
+          </a:stretch>
+        </p:blipFill>
+        <p:spPr>
+          <a:xfrm>
+            <a:off x="7073255" y="0"/>
+            <a:ext cx="5115697" cy="6858000"/>
+          </a:xfrm>
+          <a:prstGeom prst="rect">
+            <a:avLst/>
+          </a:prstGeom>
+        </p:spPr>
+      </p:pic>
+      <p:sp>
+        <p:nvSpPr>
+          <p:cNvPr id="24" name="Picture Placeholder 23">
+            <a:extLst>
+              <a:ext uri="{FF2B5EF4-FFF2-40B4-BE49-F238E27FC236}">
+                <a16:creationId xmlns:a16="http://schemas.microsoft.com/office/drawing/2014/main" id="{8CD8768C-8806-4DE0-82CC-275A2EC6D47D}"/>
+              </a:ext>
+            </a:extLst>
+          </p:cNvPr>
+          <p:cNvSpPr>
+            <a:spLocks noGrp="1"/>
+          </p:cNvSpPr>
+          <p:nvPr>
+            <p:ph type="pic" sz="quarter" idx="13"/>
+          </p:nvPr>
+        </p:nvSpPr>
+        <p:spPr>
+          <a:xfrm>
+            <a:off x="5879592" y="740664"/>
+            <a:ext cx="2798762" cy="2606040"/>
+          </a:xfrm>
+          <a:solidFill>
+            <a:schemeClr val="accent6"/>
+          </a:solidFill>
+        </p:spPr>
+        <p:txBody>
+          <a:bodyPr/>
+          <a:lstStyle/>
+          <a:p>
+            <a:endParaRPr lang="en-US" dirty="0"/>
+          </a:p>
+        </p:txBody>
+      </p:sp>
+      <p:sp>
+        <p:nvSpPr>
+          <p:cNvPr id="25" name="Picture Placeholder 23">
+            <a:extLst>
+              <a:ext uri="{FF2B5EF4-FFF2-40B4-BE49-F238E27FC236}">
+                <a16:creationId xmlns:a16="http://schemas.microsoft.com/office/drawing/2014/main" id="{68CB9DF9-86EB-48CF-B212-F2B290C56FFF}"/>
+              </a:ext>
+            </a:extLst>
+          </p:cNvPr>
+          <p:cNvSpPr>
+            <a:spLocks noGrp="1"/>
+          </p:cNvSpPr>
+          <p:nvPr>
+            <p:ph type="pic" sz="quarter" idx="14"/>
+          </p:nvPr>
+        </p:nvSpPr>
+        <p:spPr>
+          <a:xfrm>
+            <a:off x="8878824" y="740664"/>
+            <a:ext cx="2798762" cy="2606040"/>
+          </a:xfrm>
+          <a:solidFill>
+            <a:schemeClr val="accent6"/>
+          </a:solidFill>
+        </p:spPr>
+        <p:txBody>
+          <a:bodyPr/>
+          <a:lstStyle/>
+          <a:p>
+            <a:endParaRPr lang="en-US" dirty="0"/>
+          </a:p>
+        </p:txBody>
+      </p:sp>
+      <p:sp>
+        <p:nvSpPr>
+          <p:cNvPr id="26" name="Picture Placeholder 23">
+            <a:extLst>
+              <a:ext uri="{FF2B5EF4-FFF2-40B4-BE49-F238E27FC236}">
+                <a16:creationId xmlns:a16="http://schemas.microsoft.com/office/drawing/2014/main" id="{554B2207-3993-41B6-AF63-EBB48DACAB8F}"/>
+              </a:ext>
+            </a:extLst>
+          </p:cNvPr>
+          <p:cNvSpPr>
+            <a:spLocks noGrp="1"/>
+          </p:cNvSpPr>
+          <p:nvPr>
+            <p:ph type="pic" sz="quarter" idx="15"/>
+          </p:nvPr>
+        </p:nvSpPr>
+        <p:spPr>
+          <a:xfrm>
+            <a:off x="5879592" y="3529584"/>
+            <a:ext cx="2798762" cy="2606040"/>
+          </a:xfrm>
+          <a:solidFill>
+            <a:schemeClr val="accent6"/>
+          </a:solidFill>
+        </p:spPr>
+        <p:txBody>
+          <a:bodyPr/>
+          <a:lstStyle/>
+          <a:p>
+            <a:endParaRPr lang="en-US" dirty="0"/>
+          </a:p>
+        </p:txBody>
+      </p:sp>
+      <p:sp>
+        <p:nvSpPr>
+          <p:cNvPr id="27" name="Picture Placeholder 23">
+            <a:extLst>
+              <a:ext uri="{FF2B5EF4-FFF2-40B4-BE49-F238E27FC236}">
+                <a16:creationId xmlns:a16="http://schemas.microsoft.com/office/drawing/2014/main" id="{DE0340D8-BC7E-4431-A7A7-8D634C8A19F6}"/>
+              </a:ext>
+            </a:extLst>
+          </p:cNvPr>
+          <p:cNvSpPr>
+            <a:spLocks noGrp="1"/>
+          </p:cNvSpPr>
+          <p:nvPr>
+            <p:ph type="pic" sz="quarter" idx="16"/>
+          </p:nvPr>
+        </p:nvSpPr>
+        <p:spPr>
+          <a:xfrm>
+            <a:off x="8869680" y="3529584"/>
+            <a:ext cx="2798762" cy="2606040"/>
+          </a:xfrm>
+          <a:solidFill>
+            <a:schemeClr val="accent6"/>
+          </a:solidFill>
+        </p:spPr>
+        <p:txBody>
+          <a:bodyPr/>
+          <a:lstStyle/>
+          <a:p>
+            <a:endParaRPr lang="en-US" dirty="0"/>
+          </a:p>
+        </p:txBody>
+      </p:sp>
+      <p:sp>
+        <p:nvSpPr>
+          <p:cNvPr id="2" name="Date Placeholder 1">
+            <a:extLst>
+              <a:ext uri="{FF2B5EF4-FFF2-40B4-BE49-F238E27FC236}">
+                <a16:creationId xmlns:a16="http://schemas.microsoft.com/office/drawing/2014/main" id="{72933BE2-665A-42DA-A3B7-835F81A3F46B}"/>
+              </a:ext>
+            </a:extLst>
+          </p:cNvPr>
+          <p:cNvSpPr>
+            <a:spLocks noGrp="1"/>
+          </p:cNvSpPr>
+          <p:nvPr>
+            <p:ph type="dt" sz="half" idx="10"/>
+          </p:nvPr>
+        </p:nvSpPr>
+        <p:spPr/>
+        <p:txBody>
+          <a:bodyPr/>
+          <a:lstStyle/>
+          <a:p>
+            <a:r>
+              <a:rPr lang="en-US"/>
+              <a:t>20XX</a:t>
+            </a:r>
+            <a:endParaRPr lang="en-US" dirty="0"/>
+          </a:p>
+        </p:txBody>
+      </p:sp>
+      <p:sp>
+        <p:nvSpPr>
+          <p:cNvPr id="3" name="Footer Placeholder 2">
+            <a:extLst>
+              <a:ext uri="{FF2B5EF4-FFF2-40B4-BE49-F238E27FC236}">
+                <a16:creationId xmlns:a16="http://schemas.microsoft.com/office/drawing/2014/main" id="{634DBCBD-AD42-432D-ABA9-20D616AF3ED7}"/>
+              </a:ext>
+            </a:extLst>
+          </p:cNvPr>
+          <p:cNvSpPr>
+            <a:spLocks noGrp="1"/>
+          </p:cNvSpPr>
+          <p:nvPr>
+            <p:ph type="ftr" sz="quarter" idx="11"/>
+          </p:nvPr>
+        </p:nvSpPr>
+        <p:spPr/>
+        <p:txBody>
+          <a:bodyPr/>
+          <a:lstStyle/>
+          <a:p>
+            <a:r>
+              <a:rPr lang="en-US" dirty="0"/>
+              <a:t>Sample Footer Text</a:t>
+            </a:r>
+          </a:p>
+        </p:txBody>
+      </p:sp>
+      <p:sp>
+        <p:nvSpPr>
+          <p:cNvPr id="4" name="Slide Number Placeholder 3">
+            <a:extLst>
+              <a:ext uri="{FF2B5EF4-FFF2-40B4-BE49-F238E27FC236}">
+                <a16:creationId xmlns:a16="http://schemas.microsoft.com/office/drawing/2014/main" id="{EE140251-3596-4673-B24B-59A6F9ED8FB3}"/>
+              </a:ext>
+            </a:extLst>
+          </p:cNvPr>
+          <p:cNvSpPr>
+            <a:spLocks noGrp="1"/>
+          </p:cNvSpPr>
+          <p:nvPr>
+            <p:ph type="sldNum" sz="quarter" idx="12"/>
+          </p:nvPr>
+        </p:nvSpPr>
+        <p:spPr/>
+        <p:txBody>
+          <a:bodyPr/>
+          <a:lstStyle/>
+          <a:p>
+            <a:fld id="{73B850FF-6169-4056-8077-06FFA93A5366}" type="slidenum">
+              <a:rPr lang="en-US" smtClean="0"/>
+              <a:t>‹#›</a:t>
+            </a:fld>
+            <a:endParaRPr lang="en-US" dirty="0"/>
+          </a:p>
+        </p:txBody>
+      </p:sp>
+    </p:spTree>
+    <p:extLst>
+      <p:ext uri="{BB962C8B-B14F-4D97-AF65-F5344CB8AC3E}">
+        <p14:creationId xmlns:p14="http://schemas.microsoft.com/office/powerpoint/2010/main" val="2958411415"/>
+      </p:ext>
+    </p:extLst>
+  </p:cSld>
+  <p:clrMapOvr>
+    <a:masterClrMapping/>
+  </p:clrMapOvr>
+</p:sldLayout>
+</file>
+
+<file path=ppt/slideLayouts/slideLayout11.xml><?xml version="1.0" encoding="utf-8"?>
 <p:sldLayout xmlns:a="http://schemas.openxmlformats.org/drawingml/2006/main" xmlns:r="http://schemas.openxmlformats.org/officeDocument/2006/relationships" xmlns:p="http://schemas.openxmlformats.org/presentationml/2006/main" showMasterSp="0" preserve="1" userDrawn="1">
   <p:cSld name="Closing">
     <p:spTree>
@@ -5915,7 +5919,7 @@
 </p:sldLayout>
 </file>
 
-<file path=ppt/slideLayouts/slideLayout126.xml><?xml version="1.0" encoding="utf-8"?>
+<file path=ppt/slideLayouts/slideLayout12.xml><?xml version="1.0" encoding="utf-8"?>
 <p:sldLayout xmlns:a="http://schemas.openxmlformats.org/drawingml/2006/main" xmlns:r="http://schemas.openxmlformats.org/officeDocument/2006/relationships" xmlns:p="http://schemas.openxmlformats.org/presentationml/2006/main" type="title" preserve="1">
   <p:cSld name="Title Slide">
     <p:spTree>
@@ -6056,7 +6060,7 @@
 </p:sldLayout>
 </file>
 
-<file path=ppt/slideLayouts/slideLayout133.xml><?xml version="1.0" encoding="utf-8"?>
+<file path=ppt/slideLayouts/slideLayout13.xml><?xml version="1.0" encoding="utf-8"?>
 <p:sldLayout xmlns:a="http://schemas.openxmlformats.org/drawingml/2006/main" xmlns:r="http://schemas.openxmlformats.org/officeDocument/2006/relationships" xmlns:p="http://schemas.openxmlformats.org/presentationml/2006/main" type="secHead" preserve="1">
   <p:cSld name="Section Header">
     <p:spTree>
@@ -6246,7 +6250,7 @@
 </p:sldLayout>
 </file>
 
-<file path=ppt/slideLayouts/slideLayout1417.xml><?xml version="1.0" encoding="utf-8"?>
+<file path=ppt/slideLayouts/slideLayout14.xml><?xml version="1.0" encoding="utf-8"?>
 <p:sldLayout xmlns:a="http://schemas.openxmlformats.org/drawingml/2006/main" xmlns:r="http://schemas.openxmlformats.org/officeDocument/2006/relationships" xmlns:p="http://schemas.openxmlformats.org/presentationml/2006/main" type="twoObj" preserve="1">
   <p:cSld name="Two Content">
     <p:spTree>
@@ -6522,7 +6526,7 @@
 </p:sldLayout>
 </file>
 
-<file path=ppt/slideLayouts/slideLayout1513.xml><?xml version="1.0" encoding="utf-8"?>
+<file path=ppt/slideLayouts/slideLayout15.xml><?xml version="1.0" encoding="utf-8"?>
 <p:sldLayout xmlns:a="http://schemas.openxmlformats.org/drawingml/2006/main" xmlns:r="http://schemas.openxmlformats.org/officeDocument/2006/relationships" xmlns:p="http://schemas.openxmlformats.org/presentationml/2006/main" type="blank" preserve="1">
   <p:cSld name="Blank">
     <p:spTree>
@@ -6638,7 +6642,7 @@
 </p:sldLayout>
 </file>
 
-<file path=ppt/slideLayouts/slideLayout169.xml><?xml version="1.0" encoding="utf-8"?>
+<file path=ppt/slideLayouts/slideLayout16.xml><?xml version="1.0" encoding="utf-8"?>
 <p:sldLayout xmlns:a="http://schemas.openxmlformats.org/drawingml/2006/main" xmlns:r="http://schemas.openxmlformats.org/officeDocument/2006/relationships" xmlns:p="http://schemas.openxmlformats.org/presentationml/2006/main" type="objTx" preserve="1">
   <p:cSld name="Content with Caption">
     <p:spTree>
@@ -6952,7 +6956,7 @@
 </p:sldLayout>
 </file>
 
-<file path=ppt/slideLayouts/slideLayout177.xml><?xml version="1.0" encoding="utf-8"?>
+<file path=ppt/slideLayouts/slideLayout17.xml><?xml version="1.0" encoding="utf-8"?>
 <p:sldLayout xmlns:a="http://schemas.openxmlformats.org/drawingml/2006/main" xmlns:r="http://schemas.openxmlformats.org/officeDocument/2006/relationships" xmlns:p="http://schemas.openxmlformats.org/presentationml/2006/main" type="picTx" preserve="1">
   <p:cSld name="Picture with Caption">
     <p:spTree>
@@ -7246,7 +7250,7 @@
 </p:sldLayout>
 </file>
 
-<file path=ppt/slideLayouts/slideLayout28.xml><?xml version="1.0" encoding="utf-8"?>
+<file path=ppt/slideLayouts/slideLayout2.xml><?xml version="1.0" encoding="utf-8"?>
 <p:sldLayout xmlns:a="http://schemas.openxmlformats.org/drawingml/2006/main" xmlns:r="http://schemas.openxmlformats.org/officeDocument/2006/relationships" xmlns:p="http://schemas.openxmlformats.org/presentationml/2006/main" showMasterSp="0" preserve="1" userDrawn="1">
   <p:cSld name="Agnda">
     <p:spTree>
@@ -7745,7 +7749,7 @@
 </p:sldLayout>
 </file>
 
-<file path=ppt/slideLayouts/slideLayout34.xml><?xml version="1.0" encoding="utf-8"?>
+<file path=ppt/slideLayouts/slideLayout3.xml><?xml version="1.0" encoding="utf-8"?>
 <p:sldLayout xmlns:a="http://schemas.openxmlformats.org/drawingml/2006/main" xmlns:r="http://schemas.openxmlformats.org/officeDocument/2006/relationships" xmlns:p="http://schemas.openxmlformats.org/presentationml/2006/main" preserve="1" userDrawn="1">
   <p:cSld name="Introduction">
     <p:spTree>
@@ -8090,7 +8094,7 @@
 </p:sldLayout>
 </file>
 
-<file path=ppt/slideLayouts/slideLayout415.xml><?xml version="1.0" encoding="utf-8"?>
+<file path=ppt/slideLayouts/slideLayout4.xml><?xml version="1.0" encoding="utf-8"?>
 <p:sldLayout xmlns:a="http://schemas.openxmlformats.org/drawingml/2006/main" xmlns:r="http://schemas.openxmlformats.org/officeDocument/2006/relationships" xmlns:p="http://schemas.openxmlformats.org/presentationml/2006/main" showMasterSp="0" preserve="1" userDrawn="1">
   <p:cSld name="Section break">
     <p:spTree>
@@ -8485,7 +8489,7 @@
 </p:sldLayout>
 </file>
 
-<file path=ppt/slideLayouts/slideLayout512.xml><?xml version="1.0" encoding="utf-8"?>
+<file path=ppt/slideLayouts/slideLayout5.xml><?xml version="1.0" encoding="utf-8"?>
 <p:sldLayout xmlns:a="http://schemas.openxmlformats.org/drawingml/2006/main" xmlns:r="http://schemas.openxmlformats.org/officeDocument/2006/relationships" xmlns:p="http://schemas.openxmlformats.org/presentationml/2006/main" type="obj" preserve="1">
   <p:cSld name="Title and Content">
     <p:spTree>
@@ -8693,7 +8697,7 @@
 </p:sldLayout>
 </file>
 
-<file path=ppt/slideLayouts/slideLayout61.xml><?xml version="1.0" encoding="utf-8"?>
+<file path=ppt/slideLayouts/slideLayout6.xml><?xml version="1.0" encoding="utf-8"?>
 <p:sldLayout xmlns:a="http://schemas.openxmlformats.org/drawingml/2006/main" xmlns:r="http://schemas.openxmlformats.org/officeDocument/2006/relationships" xmlns:p="http://schemas.openxmlformats.org/presentationml/2006/main" preserve="1" userDrawn="1">
   <p:cSld name="Team">
     <p:spTree>
@@ -9391,7 +9395,7 @@
 </p:sldLayout>
 </file>
 
-<file path=ppt/slideLayouts/slideLayout75.xml><?xml version="1.0" encoding="utf-8"?>
+<file path=ppt/slideLayouts/slideLayout7.xml><?xml version="1.0" encoding="utf-8"?>
 <p:sldLayout xmlns:a="http://schemas.openxmlformats.org/drawingml/2006/main" xmlns:r="http://schemas.openxmlformats.org/officeDocument/2006/relationships" xmlns:p="http://schemas.openxmlformats.org/presentationml/2006/main" showMasterSp="0" preserve="1" userDrawn="1">
   <p:cSld name="Quote">
     <p:spTree>
@@ -9890,7 +9894,7 @@
 </p:sldLayout>
 </file>
 
-<file path=ppt/slideLayouts/slideLayout82.xml><?xml version="1.0" encoding="utf-8"?>
+<file path=ppt/slideLayouts/slideLayout8.xml><?xml version="1.0" encoding="utf-8"?>
 <p:sldLayout xmlns:a="http://schemas.openxmlformats.org/drawingml/2006/main" xmlns:r="http://schemas.openxmlformats.org/officeDocument/2006/relationships" xmlns:p="http://schemas.openxmlformats.org/presentationml/2006/main" type="twoTxTwoObj" preserve="1">
   <p:cSld name="Comparison">
     <p:spTree>
@@ -10342,7 +10346,7 @@
 </p:sldLayout>
 </file>
 
-<file path=ppt/slideLayouts/slideLayout916.xml><?xml version="1.0" encoding="utf-8"?>
+<file path=ppt/slideLayouts/slideLayout9.xml><?xml version="1.0" encoding="utf-8"?>
 <p:sldLayout xmlns:a="http://schemas.openxmlformats.org/drawingml/2006/main" xmlns:r="http://schemas.openxmlformats.org/officeDocument/2006/relationships" xmlns:p="http://schemas.openxmlformats.org/presentationml/2006/main" preserve="1" userDrawn="1">
   <p:cSld name="Three Content">
     <p:spTree>
@@ -10947,7 +10951,7 @@
 </p:sldLayout>
 </file>
 
-<file path=ppt/slideMasters/slideMaster11.xml><?xml version="1.0" encoding="utf-8"?>
+<file path=ppt/slideMasters/slideMaster1.xml><?xml version="1.0" encoding="utf-8"?>
 <p:sldMaster xmlns:a="http://schemas.openxmlformats.org/drawingml/2006/main" xmlns:r="http://schemas.openxmlformats.org/officeDocument/2006/relationships" xmlns:p="http://schemas.openxmlformats.org/presentationml/2006/main">
   <p:cSld>
     <p:bg>
@@ -11067,10 +11071,9 @@
           <a:lstStyle/>
           <a:p>
             <a:r>
-              <a:rPr lang="en-US"/>
+              <a:rPr lang="en-US" dirty="0"/>
               <a:t>Click to edit Master title style</a:t>
             </a:r>
-            <a:endParaRPr lang="en-US" dirty="0"/>
           </a:p>
         </p:txBody>
       </p:sp>
@@ -11107,38 +11110,37 @@
           <a:p>
             <a:pPr lvl="0"/>
             <a:r>
-              <a:rPr lang="en-US"/>
+              <a:rPr lang="en-US" dirty="0"/>
               <a:t>Click to edit Master text styles</a:t>
             </a:r>
           </a:p>
           <a:p>
             <a:pPr lvl="1"/>
             <a:r>
-              <a:rPr lang="en-US"/>
+              <a:rPr lang="en-US" dirty="0"/>
               <a:t>Second level</a:t>
             </a:r>
           </a:p>
           <a:p>
             <a:pPr lvl="2"/>
             <a:r>
-              <a:rPr lang="en-US"/>
+              <a:rPr lang="en-US" dirty="0"/>
               <a:t>Third level</a:t>
             </a:r>
           </a:p>
           <a:p>
             <a:pPr lvl="3"/>
             <a:r>
-              <a:rPr lang="en-US"/>
+              <a:rPr lang="en-US" dirty="0"/>
               <a:t>Fourth level</a:t>
             </a:r>
           </a:p>
           <a:p>
             <a:pPr lvl="4"/>
             <a:r>
-              <a:rPr lang="en-US"/>
+              <a:rPr lang="en-US" dirty="0"/>
               <a:t>Fifth level</a:t>
             </a:r>
-            <a:endParaRPr lang="en-US" dirty="0"/>
           </a:p>
         </p:txBody>
       </p:sp>
@@ -11367,7 +11369,7 @@
           <a:spcPct val="0"/>
         </a:spcBef>
         <a:buNone/>
-        <a:defRPr sz="4400" b="0" kern="1200">
+        <a:defRPr sz="3600" b="0" kern="1200">
           <a:solidFill>
             <a:schemeClr val="tx1"/>
           </a:solidFill>
@@ -11390,7 +11392,7 @@
         </a:buClr>
         <a:buFont typeface="Arial" panose="020B0604020202020204" pitchFamily="34" charset="0"/>
         <a:buChar char="•"/>
-        <a:defRPr sz="2800" kern="1200">
+        <a:defRPr sz="2000" kern="1200">
           <a:solidFill>
             <a:schemeClr val="tx1"/>
           </a:solidFill>
@@ -11411,7 +11413,7 @@
         </a:buClr>
         <a:buFont typeface="Arial" panose="020B0604020202020204" pitchFamily="34" charset="0"/>
         <a:buChar char="•"/>
-        <a:defRPr sz="2400" kern="1200">
+        <a:defRPr sz="1800" kern="1200">
           <a:solidFill>
             <a:schemeClr val="tx1"/>
           </a:solidFill>
@@ -11432,7 +11434,7 @@
         </a:buClr>
         <a:buFont typeface="Arial" panose="020B0604020202020204" pitchFamily="34" charset="0"/>
         <a:buChar char="•"/>
-        <a:defRPr sz="2000" kern="1200">
+        <a:defRPr sz="1600" kern="1200">
           <a:solidFill>
             <a:schemeClr val="tx1"/>
           </a:solidFill>
@@ -11453,7 +11455,7 @@
         </a:buClr>
         <a:buFont typeface="Arial" panose="020B0604020202020204" pitchFamily="34" charset="0"/>
         <a:buChar char="•"/>
-        <a:defRPr sz="1800" kern="1200">
+        <a:defRPr sz="1400" kern="1200">
           <a:solidFill>
             <a:schemeClr val="tx1"/>
           </a:solidFill>
@@ -11474,7 +11476,7 @@
         </a:buClr>
         <a:buFont typeface="Arial" panose="020B0604020202020204" pitchFamily="34" charset="0"/>
         <a:buChar char="•"/>
-        <a:defRPr sz="1800" kern="1200">
+        <a:defRPr sz="1400" kern="1200">
           <a:solidFill>
             <a:schemeClr val="tx1"/>
           </a:solidFill>
@@ -11655,7 +11657,7 @@
 </p:sldMaster>
 </file>
 
-<file path=ppt/slides/slide108.xml><?xml version="1.0" encoding="utf-8"?>
+<file path=ppt/slides/slide1.xml><?xml version="1.0" encoding="utf-8"?>
 <p:sld xmlns:a="http://schemas.openxmlformats.org/drawingml/2006/main" xmlns:r="http://schemas.openxmlformats.org/officeDocument/2006/relationships" xmlns:p="http://schemas.openxmlformats.org/presentationml/2006/main">
   <p:cSld>
     <p:spTree>
@@ -11677,914 +11679,6 @@
           <p:cNvPr id="2" name="Title 1">
             <a:extLst>
               <a:ext uri="{FF2B5EF4-FFF2-40B4-BE49-F238E27FC236}">
-                <a16:creationId xmlns:a16="http://schemas.microsoft.com/office/drawing/2014/main" id="{F3DB2667-6866-49FD-94D8-EA18D1E2E4FC}"/>
-              </a:ext>
-            </a:extLst>
-          </p:cNvPr>
-          <p:cNvSpPr>
-            <a:spLocks noGrp="1"/>
-          </p:cNvSpPr>
-          <p:nvPr>
-            <p:ph type="title"/>
-          </p:nvPr>
-        </p:nvSpPr>
-        <p:spPr>
-          <a:xfrm>
-            <a:off x="458694" y="365125"/>
-            <a:ext cx="11274612" cy="1325563"/>
-          </a:xfrm>
-        </p:spPr>
-        <p:txBody>
-          <a:bodyPr/>
-          <a:lstStyle/>
-          <a:p>
-            <a:r>
-              <a:rPr lang="en-US" dirty="0"/>
-              <a:t>Additional content</a:t>
-            </a:r>
-          </a:p>
-        </p:txBody>
-      </p:sp>
-      <p:sp>
-        <p:nvSpPr>
-          <p:cNvPr id="3" name="Text Placeholder 2">
-            <a:extLst>
-              <a:ext uri="{FF2B5EF4-FFF2-40B4-BE49-F238E27FC236}">
-                <a16:creationId xmlns:a16="http://schemas.microsoft.com/office/drawing/2014/main" id="{2BF5C676-1CD3-4A4B-BC5B-2E8A3ED1C730}"/>
-              </a:ext>
-            </a:extLst>
-          </p:cNvPr>
-          <p:cNvSpPr>
-            <a:spLocks noGrp="1"/>
-          </p:cNvSpPr>
-          <p:nvPr>
-            <p:ph type="body" idx="1"/>
-          </p:nvPr>
-        </p:nvSpPr>
-        <p:spPr>
-          <a:xfrm>
-            <a:off x="465256" y="1752600"/>
-            <a:ext cx="3291840" cy="823912"/>
-          </a:xfrm>
-        </p:spPr>
-        <p:txBody>
-          <a:bodyPr/>
-          <a:lstStyle/>
-          <a:p>
-            <a:r>
-              <a:rPr lang="en-US" dirty="0"/>
-              <a:t>Subtitle	</a:t>
-            </a:r>
-          </a:p>
-        </p:txBody>
-      </p:sp>
-      <p:sp>
-        <p:nvSpPr>
-          <p:cNvPr id="4" name="Content Placeholder 3">
-            <a:extLst>
-              <a:ext uri="{FF2B5EF4-FFF2-40B4-BE49-F238E27FC236}">
-                <a16:creationId xmlns:a16="http://schemas.microsoft.com/office/drawing/2014/main" id="{D877F40A-D6F5-43ED-8AD0-77021456CF70}"/>
-              </a:ext>
-            </a:extLst>
-          </p:cNvPr>
-          <p:cNvSpPr>
-            <a:spLocks noGrp="1"/>
-          </p:cNvSpPr>
-          <p:nvPr>
-            <p:ph sz="half" idx="2"/>
-          </p:nvPr>
-        </p:nvSpPr>
-        <p:spPr>
-          <a:xfrm>
-            <a:off x="465256" y="2666999"/>
-            <a:ext cx="3291840" cy="3522663"/>
-          </a:xfrm>
-        </p:spPr>
-        <p:txBody>
-          <a:bodyPr>
-            <a:normAutofit/>
-          </a:bodyPr>
-          <a:lstStyle/>
-          <a:p>
-            <a:r>
-              <a:rPr lang="en-US" dirty="0"/>
-              <a:t>Add text, images, art, and videos. </a:t>
-            </a:r>
-          </a:p>
-          <a:p>
-            <a:r>
-              <a:rPr lang="en-US" dirty="0"/>
-              <a:t>Add transitions, animations, and motion. </a:t>
-            </a:r>
-          </a:p>
-          <a:p>
-            <a:r>
-              <a:rPr lang="en-US" dirty="0"/>
-              <a:t>Save to OneDrive, to get to your presentations from your computer, tablet, or phone. </a:t>
-            </a:r>
-          </a:p>
-        </p:txBody>
-      </p:sp>
-      <p:sp>
-        <p:nvSpPr>
-          <p:cNvPr id="5" name="Text Placeholder 4">
-            <a:extLst>
-              <a:ext uri="{FF2B5EF4-FFF2-40B4-BE49-F238E27FC236}">
-                <a16:creationId xmlns:a16="http://schemas.microsoft.com/office/drawing/2014/main" id="{1DA967CB-50C2-4985-B7AF-9F120DAD513B}"/>
-              </a:ext>
-            </a:extLst>
-          </p:cNvPr>
-          <p:cNvSpPr>
-            <a:spLocks noGrp="1"/>
-          </p:cNvSpPr>
-          <p:nvPr>
-            <p:ph type="body" sz="quarter" idx="3"/>
-          </p:nvPr>
-        </p:nvSpPr>
-        <p:spPr>
-          <a:xfrm>
-            <a:off x="4453361" y="1752600"/>
-            <a:ext cx="3291840" cy="823912"/>
-          </a:xfrm>
-        </p:spPr>
-        <p:txBody>
-          <a:bodyPr/>
-          <a:lstStyle/>
-          <a:p>
-            <a:r>
-              <a:rPr lang="en-US" dirty="0"/>
-              <a:t>Subtitle</a:t>
-            </a:r>
-          </a:p>
-        </p:txBody>
-      </p:sp>
-      <p:sp>
-        <p:nvSpPr>
-          <p:cNvPr id="6" name="Content Placeholder 5">
-            <a:extLst>
-              <a:ext uri="{FF2B5EF4-FFF2-40B4-BE49-F238E27FC236}">
-                <a16:creationId xmlns:a16="http://schemas.microsoft.com/office/drawing/2014/main" id="{482EF994-5030-4E07-840C-7244552D986B}"/>
-              </a:ext>
-            </a:extLst>
-          </p:cNvPr>
-          <p:cNvSpPr>
-            <a:spLocks noGrp="1"/>
-          </p:cNvSpPr>
-          <p:nvPr>
-            <p:ph sz="quarter" idx="4"/>
-          </p:nvPr>
-        </p:nvSpPr>
-        <p:spPr>
-          <a:xfrm>
-            <a:off x="4453361" y="2666999"/>
-            <a:ext cx="3291840" cy="3522663"/>
-          </a:xfrm>
-        </p:spPr>
-        <p:txBody>
-          <a:bodyPr>
-            <a:normAutofit/>
-          </a:bodyPr>
-          <a:lstStyle/>
-          <a:p>
-            <a:r>
-              <a:rPr lang="en-US" dirty="0"/>
-              <a:t>Open the Design Ideas pane for instant slide makeovers. </a:t>
-            </a:r>
-          </a:p>
-          <a:p>
-            <a:r>
-              <a:rPr lang="en-US" dirty="0"/>
-              <a:t>When we have design ideas, we’ll show them to you right there.</a:t>
-            </a:r>
-          </a:p>
-        </p:txBody>
-      </p:sp>
-      <p:sp>
-        <p:nvSpPr>
-          <p:cNvPr id="7" name="Text Placeholder 6">
-            <a:extLst>
-              <a:ext uri="{FF2B5EF4-FFF2-40B4-BE49-F238E27FC236}">
-                <a16:creationId xmlns:a16="http://schemas.microsoft.com/office/drawing/2014/main" id="{4AD23BD3-930E-4738-8CE3-AD28F78749B4}"/>
-              </a:ext>
-            </a:extLst>
-          </p:cNvPr>
-          <p:cNvSpPr>
-            <a:spLocks noGrp="1"/>
-          </p:cNvSpPr>
-          <p:nvPr>
-            <p:ph type="body" sz="quarter" idx="13"/>
-          </p:nvPr>
-        </p:nvSpPr>
-        <p:spPr>
-          <a:xfrm>
-            <a:off x="8441466" y="1757319"/>
-            <a:ext cx="3291840" cy="823912"/>
-          </a:xfrm>
-        </p:spPr>
-        <p:txBody>
-          <a:bodyPr/>
-          <a:lstStyle/>
-          <a:p>
-            <a:r>
-              <a:rPr lang="en-US" dirty="0"/>
-              <a:t>Subtitle</a:t>
-            </a:r>
-          </a:p>
-        </p:txBody>
-      </p:sp>
-      <p:sp>
-        <p:nvSpPr>
-          <p:cNvPr id="8" name="Content Placeholder 7">
-            <a:extLst>
-              <a:ext uri="{FF2B5EF4-FFF2-40B4-BE49-F238E27FC236}">
-                <a16:creationId xmlns:a16="http://schemas.microsoft.com/office/drawing/2014/main" id="{40CC3728-DDD8-4CD6-A441-B8E6C24AD6C4}"/>
-              </a:ext>
-            </a:extLst>
-          </p:cNvPr>
-          <p:cNvSpPr>
-            <a:spLocks noGrp="1"/>
-          </p:cNvSpPr>
-          <p:nvPr>
-            <p:ph sz="quarter" idx="14"/>
-          </p:nvPr>
-        </p:nvSpPr>
-        <p:spPr>
-          <a:xfrm>
-            <a:off x="8441466" y="2671718"/>
-            <a:ext cx="3291840" cy="3522663"/>
-          </a:xfrm>
-        </p:spPr>
-        <p:txBody>
-          <a:bodyPr>
-            <a:noAutofit/>
-          </a:bodyPr>
-          <a:lstStyle/>
-          <a:p>
-            <a:r>
-              <a:rPr lang="en-US" dirty="0"/>
-              <a:t>This PowerPoint theme uses its own unique set of colors, fonts, and effects to create the overall look and feel of these slides. </a:t>
-            </a:r>
-          </a:p>
-          <a:p>
-            <a:r>
-              <a:rPr lang="en-US" dirty="0"/>
-              <a:t>PowerPoint has tons of themes to give your presentation just the right personality. </a:t>
-            </a:r>
-          </a:p>
-          <a:p>
-            <a:endParaRPr lang="en-US" dirty="0"/>
-          </a:p>
-        </p:txBody>
-      </p:sp>
-      <p:sp>
-        <p:nvSpPr>
-          <p:cNvPr id="10" name="Footer Placeholder 9">
-            <a:extLst>
-              <a:ext uri="{FF2B5EF4-FFF2-40B4-BE49-F238E27FC236}">
-                <a16:creationId xmlns:a16="http://schemas.microsoft.com/office/drawing/2014/main" id="{734A5D3F-D016-4901-BA4A-142F67A053A1}"/>
-              </a:ext>
-            </a:extLst>
-          </p:cNvPr>
-          <p:cNvSpPr>
-            <a:spLocks noGrp="1"/>
-          </p:cNvSpPr>
-          <p:nvPr>
-            <p:ph type="ftr" sz="quarter" idx="11"/>
-          </p:nvPr>
-        </p:nvSpPr>
-        <p:spPr>
-          <a:xfrm>
-            <a:off x="4038600" y="6416675"/>
-            <a:ext cx="4114800" cy="365125"/>
-          </a:xfrm>
-        </p:spPr>
-        <p:txBody>
-          <a:bodyPr/>
-          <a:lstStyle/>
-          <a:p>
-            <a:r>
-              <a:rPr lang="en-US" dirty="0"/>
-              <a:t>Sample Footer Text</a:t>
-            </a:r>
-          </a:p>
-        </p:txBody>
-      </p:sp>
-      <p:sp>
-        <p:nvSpPr>
-          <p:cNvPr id="11" name="Slide Number Placeholder 10">
-            <a:extLst>
-              <a:ext uri="{FF2B5EF4-FFF2-40B4-BE49-F238E27FC236}">
-                <a16:creationId xmlns:a16="http://schemas.microsoft.com/office/drawing/2014/main" id="{1E86CC9B-7D25-4B39-8677-4C84DD12F5ED}"/>
-              </a:ext>
-            </a:extLst>
-          </p:cNvPr>
-          <p:cNvSpPr>
-            <a:spLocks noGrp="1"/>
-          </p:cNvSpPr>
-          <p:nvPr>
-            <p:ph type="sldNum" sz="quarter" idx="12"/>
-          </p:nvPr>
-        </p:nvSpPr>
-        <p:spPr>
-          <a:xfrm>
-            <a:off x="8990106" y="6416675"/>
-            <a:ext cx="2743200" cy="365125"/>
-          </a:xfrm>
-        </p:spPr>
-        <p:txBody>
-          <a:bodyPr/>
-          <a:lstStyle/>
-          <a:p>
-            <a:fld id="{73B850FF-6169-4056-8077-06FFA93A5366}" type="slidenum">
-              <a:rPr lang="en-US" smtClean="0"/>
-              <a:pPr/>
-              <a:t>10</a:t>
-            </a:fld>
-            <a:endParaRPr lang="en-US" dirty="0"/>
-          </a:p>
-        </p:txBody>
-      </p:sp>
-    </p:spTree>
-    <p:extLst>
-      <p:ext uri="{BB962C8B-B14F-4D97-AF65-F5344CB8AC3E}">
-        <p14:creationId xmlns:p14="http://schemas.microsoft.com/office/powerpoint/2010/main" val="3184922546"/>
-      </p:ext>
-    </p:extLst>
-  </p:cSld>
-  <p:clrMapOvr>
-    <a:masterClrMapping/>
-  </p:clrMapOvr>
-</p:sld>
-</file>
-
-<file path=ppt/slides/slide115.xml><?xml version="1.0" encoding="utf-8"?>
-<p:sld xmlns:a="http://schemas.openxmlformats.org/drawingml/2006/main" xmlns:r="http://schemas.openxmlformats.org/officeDocument/2006/relationships" xmlns:p="http://schemas.openxmlformats.org/presentationml/2006/main">
-  <p:cSld>
-    <p:spTree>
-      <p:nvGrpSpPr>
-        <p:cNvPr id="1" name=""/>
-        <p:cNvGrpSpPr/>
-        <p:nvPr/>
-      </p:nvGrpSpPr>
-      <p:grpSpPr>
-        <a:xfrm>
-          <a:off x="0" y="0"/>
-          <a:ext cx="0" cy="0"/>
-          <a:chOff x="0" y="0"/>
-          <a:chExt cx="0" cy="0"/>
-        </a:xfrm>
-      </p:grpSpPr>
-      <p:sp>
-        <p:nvSpPr>
-          <p:cNvPr id="2" name="Title 1">
-            <a:extLst>
-              <a:ext uri="{FF2B5EF4-FFF2-40B4-BE49-F238E27FC236}">
-                <a16:creationId xmlns:a16="http://schemas.microsoft.com/office/drawing/2014/main" id="{47BB4790-9373-45EB-B7D9-55C919806E04}"/>
-              </a:ext>
-            </a:extLst>
-          </p:cNvPr>
-          <p:cNvSpPr>
-            <a:spLocks noGrp="1"/>
-          </p:cNvSpPr>
-          <p:nvPr>
-            <p:ph type="title"/>
-          </p:nvPr>
-        </p:nvSpPr>
-        <p:spPr>
-          <a:xfrm>
-            <a:off x="838200" y="393192"/>
-            <a:ext cx="4524956" cy="2130552"/>
-          </a:xfrm>
-        </p:spPr>
-        <p:txBody>
-          <a:bodyPr/>
-          <a:lstStyle/>
-          <a:p>
-            <a:r>
-              <a:rPr lang="en-US" dirty="0"/>
-              <a:t>Summary</a:t>
-            </a:r>
-          </a:p>
-        </p:txBody>
-      </p:sp>
-      <p:sp>
-        <p:nvSpPr>
-          <p:cNvPr id="3" name="Content Placeholder 2">
-            <a:extLst>
-              <a:ext uri="{FF2B5EF4-FFF2-40B4-BE49-F238E27FC236}">
-                <a16:creationId xmlns:a16="http://schemas.microsoft.com/office/drawing/2014/main" id="{B1D0CE80-526E-48B1-B2DA-C85E67C0F85C}"/>
-              </a:ext>
-            </a:extLst>
-          </p:cNvPr>
-          <p:cNvSpPr>
-            <a:spLocks noGrp="1"/>
-          </p:cNvSpPr>
-          <p:nvPr>
-            <p:ph idx="1"/>
-          </p:nvPr>
-        </p:nvSpPr>
-        <p:spPr>
-          <a:xfrm>
-            <a:off x="838200" y="2727297"/>
-            <a:ext cx="4524664" cy="3412969"/>
-          </a:xfrm>
-        </p:spPr>
-        <p:txBody>
-          <a:bodyPr anchor="t" anchorCtr="0">
-            <a:noAutofit/>
-          </a:bodyPr>
-          <a:lstStyle/>
-          <a:p>
-            <a:r>
-              <a:rPr lang="en-US" dirty="0"/>
-              <a:t>With PowerPoint, you can create presentations and share your work with others, wherever they are. Type the text you want here to get started. You can also add images, art, and videos on this template. Save to OneDrive and access your presentations from your computer, tablet, or phone. </a:t>
-            </a:r>
-          </a:p>
-        </p:txBody>
-      </p:sp>
-      <p:pic>
-        <p:nvPicPr>
-          <p:cNvPr id="11" name="Picture Placeholder 10" descr="A hand holding a sign">
-            <a:extLst>
-              <a:ext uri="{FF2B5EF4-FFF2-40B4-BE49-F238E27FC236}">
-                <a16:creationId xmlns:a16="http://schemas.microsoft.com/office/drawing/2014/main" id="{D2E14100-F835-4C99-9055-0F12058286DE}"/>
-              </a:ext>
-            </a:extLst>
-          </p:cNvPr>
-          <p:cNvPicPr>
-            <a:picLocks noGrp="1" noChangeAspect="1"/>
-          </p:cNvPicPr>
-          <p:nvPr>
-            <p:ph type="pic" sz="quarter" idx="13"/>
-          </p:nvPr>
-        </p:nvPicPr>
-        <p:blipFill rotWithShape="1">
-          <a:blip r:embed="rId2" cstate="screen">
-            <a:extLst>
-              <a:ext uri="{28A0092B-C50C-407E-A947-70E740481C1C}">
-                <a14:useLocalDpi xmlns:a14="http://schemas.microsoft.com/office/drawing/2010/main" val="0"/>
-              </a:ext>
-            </a:extLst>
-          </a:blip>
-          <a:srcRect/>
-          <a:stretch/>
-        </p:blipFill>
-        <p:spPr>
-          <a:xfrm>
-            <a:off x="5879592" y="740664"/>
-            <a:ext cx="2798762" cy="2606040"/>
-          </a:xfrm>
-        </p:spPr>
-      </p:pic>
-      <p:pic>
-        <p:nvPicPr>
-          <p:cNvPr id="13" name="Picture Placeholder 12" descr="A person cutting flowers">
-            <a:extLst>
-              <a:ext uri="{FF2B5EF4-FFF2-40B4-BE49-F238E27FC236}">
-                <a16:creationId xmlns:a16="http://schemas.microsoft.com/office/drawing/2014/main" id="{A733BA33-AE5B-45E8-B9BD-9163D1AF1A80}"/>
-              </a:ext>
-            </a:extLst>
-          </p:cNvPr>
-          <p:cNvPicPr>
-            <a:picLocks noGrp="1" noChangeAspect="1"/>
-          </p:cNvPicPr>
-          <p:nvPr>
-            <p:ph type="pic" sz="quarter" idx="14"/>
-          </p:nvPr>
-        </p:nvPicPr>
-        <p:blipFill rotWithShape="1">
-          <a:blip r:embed="rId3" cstate="screen">
-            <a:extLst>
-              <a:ext uri="{28A0092B-C50C-407E-A947-70E740481C1C}">
-                <a14:useLocalDpi xmlns:a14="http://schemas.microsoft.com/office/drawing/2010/main" val="0"/>
-              </a:ext>
-            </a:extLst>
-          </a:blip>
-          <a:srcRect/>
-          <a:stretch/>
-        </p:blipFill>
-        <p:spPr>
-          <a:xfrm>
-            <a:off x="8878824" y="740664"/>
-            <a:ext cx="2798762" cy="2606040"/>
-          </a:xfrm>
-        </p:spPr>
-      </p:pic>
-      <p:pic>
-        <p:nvPicPr>
-          <p:cNvPr id="15" name="Picture Placeholder 14" descr="A bunch of flowers">
-            <a:extLst>
-              <a:ext uri="{FF2B5EF4-FFF2-40B4-BE49-F238E27FC236}">
-                <a16:creationId xmlns:a16="http://schemas.microsoft.com/office/drawing/2014/main" id="{97330ACA-B8F2-4749-A572-895C6975B433}"/>
-              </a:ext>
-            </a:extLst>
-          </p:cNvPr>
-          <p:cNvPicPr>
-            <a:picLocks noGrp="1" noChangeAspect="1"/>
-          </p:cNvPicPr>
-          <p:nvPr>
-            <p:ph type="pic" sz="quarter" idx="15"/>
-          </p:nvPr>
-        </p:nvPicPr>
-        <p:blipFill rotWithShape="1">
-          <a:blip r:embed="rId4" cstate="screen">
-            <a:extLst>
-              <a:ext uri="{28A0092B-C50C-407E-A947-70E740481C1C}">
-                <a14:useLocalDpi xmlns:a14="http://schemas.microsoft.com/office/drawing/2010/main" val="0"/>
-              </a:ext>
-            </a:extLst>
-          </a:blip>
-          <a:srcRect/>
-          <a:stretch/>
-        </p:blipFill>
-        <p:spPr>
-          <a:xfrm>
-            <a:off x="5879592" y="3529584"/>
-            <a:ext cx="2798762" cy="2606040"/>
-          </a:xfrm>
-        </p:spPr>
-      </p:pic>
-      <p:pic>
-        <p:nvPicPr>
-          <p:cNvPr id="17" name="Picture Placeholder 16" descr="A person smiling for the camera with an apron on">
-            <a:extLst>
-              <a:ext uri="{FF2B5EF4-FFF2-40B4-BE49-F238E27FC236}">
-                <a16:creationId xmlns:a16="http://schemas.microsoft.com/office/drawing/2014/main" id="{CE0F719B-40D6-4669-945A-BF20CF680BCD}"/>
-              </a:ext>
-            </a:extLst>
-          </p:cNvPr>
-          <p:cNvPicPr>
-            <a:picLocks noGrp="1" noChangeAspect="1"/>
-          </p:cNvPicPr>
-          <p:nvPr>
-            <p:ph type="pic" sz="quarter" idx="16"/>
-          </p:nvPr>
-        </p:nvPicPr>
-        <p:blipFill rotWithShape="1">
-          <a:blip r:embed="rId5" cstate="screen">
-            <a:extLst>
-              <a:ext uri="{28A0092B-C50C-407E-A947-70E740481C1C}">
-                <a14:useLocalDpi xmlns:a14="http://schemas.microsoft.com/office/drawing/2010/main" val="0"/>
-              </a:ext>
-            </a:extLst>
-          </a:blip>
-          <a:srcRect/>
-          <a:stretch/>
-        </p:blipFill>
-        <p:spPr>
-          <a:xfrm>
-            <a:off x="8869680" y="3529584"/>
-            <a:ext cx="2798762" cy="2606040"/>
-          </a:xfrm>
-        </p:spPr>
-      </p:pic>
-      <p:sp>
-        <p:nvSpPr>
-          <p:cNvPr id="5" name="Footer Placeholder 4">
-            <a:extLst>
-              <a:ext uri="{FF2B5EF4-FFF2-40B4-BE49-F238E27FC236}">
-                <a16:creationId xmlns:a16="http://schemas.microsoft.com/office/drawing/2014/main" id="{FB47D7BA-5863-41A3-B873-B1DB20B8F6E7}"/>
-              </a:ext>
-            </a:extLst>
-          </p:cNvPr>
-          <p:cNvSpPr>
-            <a:spLocks noGrp="1"/>
-          </p:cNvSpPr>
-          <p:nvPr>
-            <p:ph type="ftr" sz="quarter" idx="11"/>
-          </p:nvPr>
-        </p:nvSpPr>
-        <p:spPr>
-          <a:xfrm>
-            <a:off x="4038600" y="6416675"/>
-            <a:ext cx="4114800" cy="365125"/>
-          </a:xfrm>
-        </p:spPr>
-        <p:txBody>
-          <a:bodyPr/>
-          <a:lstStyle/>
-          <a:p>
-            <a:r>
-              <a:rPr lang="en-US" dirty="0"/>
-              <a:t>Sample Footer Text</a:t>
-            </a:r>
-          </a:p>
-        </p:txBody>
-      </p:sp>
-      <p:sp>
-        <p:nvSpPr>
-          <p:cNvPr id="6" name="Slide Number Placeholder 5">
-            <a:extLst>
-              <a:ext uri="{FF2B5EF4-FFF2-40B4-BE49-F238E27FC236}">
-                <a16:creationId xmlns:a16="http://schemas.microsoft.com/office/drawing/2014/main" id="{02CB87F6-DDB9-4203-B293-91A0DBC60A45}"/>
-              </a:ext>
-            </a:extLst>
-          </p:cNvPr>
-          <p:cNvSpPr>
-            <a:spLocks noGrp="1"/>
-          </p:cNvSpPr>
-          <p:nvPr>
-            <p:ph type="sldNum" sz="quarter" idx="12"/>
-          </p:nvPr>
-        </p:nvSpPr>
-        <p:spPr>
-          <a:xfrm>
-            <a:off x="8990106" y="6416675"/>
-            <a:ext cx="2743200" cy="365125"/>
-          </a:xfrm>
-        </p:spPr>
-        <p:txBody>
-          <a:bodyPr/>
-          <a:lstStyle/>
-          <a:p>
-            <a:fld id="{73B850FF-6169-4056-8077-06FFA93A5366}" type="slidenum">
-              <a:rPr lang="en-US" smtClean="0"/>
-              <a:pPr/>
-              <a:t>11</a:t>
-            </a:fld>
-            <a:endParaRPr lang="en-US" dirty="0"/>
-          </a:p>
-        </p:txBody>
-      </p:sp>
-    </p:spTree>
-    <p:extLst>
-      <p:ext uri="{BB962C8B-B14F-4D97-AF65-F5344CB8AC3E}">
-        <p14:creationId xmlns:p14="http://schemas.microsoft.com/office/powerpoint/2010/main" val="1349847217"/>
-      </p:ext>
-    </p:extLst>
-  </p:cSld>
-  <p:clrMapOvr>
-    <a:masterClrMapping/>
-  </p:clrMapOvr>
-</p:sld>
-</file>
-
-<file path=ppt/slides/slide122.xml><?xml version="1.0" encoding="utf-8"?>
-<p:sld xmlns:a="http://schemas.openxmlformats.org/drawingml/2006/main" xmlns:r="http://schemas.openxmlformats.org/officeDocument/2006/relationships" xmlns:p="http://schemas.openxmlformats.org/presentationml/2006/main">
-  <p:cSld>
-    <p:spTree>
-      <p:nvGrpSpPr>
-        <p:cNvPr id="1" name=""/>
-        <p:cNvGrpSpPr/>
-        <p:nvPr/>
-      </p:nvGrpSpPr>
-      <p:grpSpPr>
-        <a:xfrm>
-          <a:off x="0" y="0"/>
-          <a:ext cx="0" cy="0"/>
-          <a:chOff x="0" y="0"/>
-          <a:chExt cx="0" cy="0"/>
-        </a:xfrm>
-      </p:grpSpPr>
-      <p:sp>
-        <p:nvSpPr>
-          <p:cNvPr id="2" name="Title 1">
-            <a:extLst>
-              <a:ext uri="{FF2B5EF4-FFF2-40B4-BE49-F238E27FC236}">
-                <a16:creationId xmlns:a16="http://schemas.microsoft.com/office/drawing/2014/main" id="{515381D8-DFFF-4518-A87C-2FF7F02CCDA1}"/>
-              </a:ext>
-            </a:extLst>
-          </p:cNvPr>
-          <p:cNvSpPr>
-            <a:spLocks noGrp="1"/>
-          </p:cNvSpPr>
-          <p:nvPr>
-            <p:ph type="ctrTitle"/>
-          </p:nvPr>
-        </p:nvSpPr>
-        <p:spPr>
-          <a:xfrm>
-            <a:off x="996275" y="394623"/>
-            <a:ext cx="5996619" cy="2131033"/>
-          </a:xfrm>
-        </p:spPr>
-        <p:txBody>
-          <a:bodyPr/>
-          <a:lstStyle/>
-          <a:p>
-            <a:r>
-              <a:rPr lang="en-US" dirty="0"/>
-              <a:t>Thank you</a:t>
-            </a:r>
-          </a:p>
-        </p:txBody>
-      </p:sp>
-      <p:sp>
-        <p:nvSpPr>
-          <p:cNvPr id="3" name="Subtitle 2">
-            <a:extLst>
-              <a:ext uri="{FF2B5EF4-FFF2-40B4-BE49-F238E27FC236}">
-                <a16:creationId xmlns:a16="http://schemas.microsoft.com/office/drawing/2014/main" id="{4DF80084-FC54-42F2-9B3A-553D97B02633}"/>
-              </a:ext>
-            </a:extLst>
-          </p:cNvPr>
-          <p:cNvSpPr>
-            <a:spLocks noGrp="1"/>
-          </p:cNvSpPr>
-          <p:nvPr>
-            <p:ph type="subTitle" idx="1"/>
-          </p:nvPr>
-        </p:nvSpPr>
-        <p:spPr>
-          <a:xfrm>
-            <a:off x="7185429" y="381000"/>
-            <a:ext cx="3997745" cy="2133600"/>
-          </a:xfrm>
-        </p:spPr>
-        <p:txBody>
-          <a:bodyPr/>
-          <a:lstStyle/>
-          <a:p>
-            <a:r>
-              <a:rPr lang="en-US" dirty="0"/>
-              <a:t>Presenter name</a:t>
-            </a:r>
-          </a:p>
-          <a:p>
-            <a:r>
-              <a:rPr lang="en-US" dirty="0"/>
-              <a:t>Email address</a:t>
-            </a:r>
-          </a:p>
-          <a:p>
-            <a:r>
-              <a:rPr lang="en-US" dirty="0"/>
-              <a:t>Website</a:t>
-            </a:r>
-          </a:p>
-        </p:txBody>
-      </p:sp>
-      <p:pic>
-        <p:nvPicPr>
-          <p:cNvPr id="7" name="Picture Placeholder 6" descr="A person boxing flowers">
-            <a:extLst>
-              <a:ext uri="{FF2B5EF4-FFF2-40B4-BE49-F238E27FC236}">
-                <a16:creationId xmlns:a16="http://schemas.microsoft.com/office/drawing/2014/main" id="{5BF31D2B-C056-4DF4-B56D-B79671C937B5}"/>
-              </a:ext>
-            </a:extLst>
-          </p:cNvPr>
-          <p:cNvPicPr>
-            <a:picLocks noGrp="1" noChangeAspect="1"/>
-          </p:cNvPicPr>
-          <p:nvPr>
-            <p:ph type="pic" sz="quarter" idx="13"/>
-          </p:nvPr>
-        </p:nvPicPr>
-        <p:blipFill rotWithShape="1">
-          <a:blip r:embed="rId2" cstate="screen">
-            <a:extLst>
-              <a:ext uri="{28A0092B-C50C-407E-A947-70E740481C1C}">
-                <a14:useLocalDpi xmlns:a14="http://schemas.microsoft.com/office/drawing/2010/main" val="0"/>
-              </a:ext>
-            </a:extLst>
-          </a:blip>
-          <a:srcRect/>
-          <a:stretch/>
-        </p:blipFill>
-        <p:spPr>
-          <a:xfrm>
-            <a:off x="813816" y="2670048"/>
-            <a:ext cx="5175504" cy="3639312"/>
-          </a:xfrm>
-        </p:spPr>
-      </p:pic>
-      <p:pic>
-        <p:nvPicPr>
-          <p:cNvPr id="9" name="Picture Placeholder 8" descr="A basket of flowers">
-            <a:extLst>
-              <a:ext uri="{FF2B5EF4-FFF2-40B4-BE49-F238E27FC236}">
-                <a16:creationId xmlns:a16="http://schemas.microsoft.com/office/drawing/2014/main" id="{18FA2AC7-49CD-49AE-8CF7-9D33C8C4E739}"/>
-              </a:ext>
-            </a:extLst>
-          </p:cNvPr>
-          <p:cNvPicPr>
-            <a:picLocks noGrp="1" noChangeAspect="1"/>
-          </p:cNvPicPr>
-          <p:nvPr>
-            <p:ph type="pic" sz="quarter" idx="14"/>
-          </p:nvPr>
-        </p:nvPicPr>
-        <p:blipFill rotWithShape="1">
-          <a:blip r:embed="rId3" cstate="screen">
-            <a:extLst>
-              <a:ext uri="{28A0092B-C50C-407E-A947-70E740481C1C}">
-                <a14:useLocalDpi xmlns:a14="http://schemas.microsoft.com/office/drawing/2010/main" val="0"/>
-              </a:ext>
-            </a:extLst>
-          </a:blip>
-          <a:srcRect/>
-          <a:stretch/>
-        </p:blipFill>
-        <p:spPr>
-          <a:xfrm>
-            <a:off x="6190488" y="2670048"/>
-            <a:ext cx="5175504" cy="3639312"/>
-          </a:xfrm>
-        </p:spPr>
-      </p:pic>
-      <p:sp>
-        <p:nvSpPr>
-          <p:cNvPr id="5" name="Footer Placeholder 4">
-            <a:extLst>
-              <a:ext uri="{FF2B5EF4-FFF2-40B4-BE49-F238E27FC236}">
-                <a16:creationId xmlns:a16="http://schemas.microsoft.com/office/drawing/2014/main" id="{6346BE14-BD4F-4DBD-9B58-FC4C6EC5D2B9}"/>
-              </a:ext>
-            </a:extLst>
-          </p:cNvPr>
-          <p:cNvSpPr>
-            <a:spLocks noGrp="1"/>
-          </p:cNvSpPr>
-          <p:nvPr>
-            <p:ph type="ftr" sz="quarter" idx="11"/>
-          </p:nvPr>
-        </p:nvSpPr>
-        <p:spPr>
-          <a:xfrm>
-            <a:off x="4038600" y="6416675"/>
-            <a:ext cx="4114800" cy="365125"/>
-          </a:xfrm>
-        </p:spPr>
-        <p:txBody>
-          <a:bodyPr/>
-          <a:lstStyle/>
-          <a:p>
-            <a:r>
-              <a:rPr lang="en-US" dirty="0"/>
-              <a:t>Sample Footer Text</a:t>
-            </a:r>
-          </a:p>
-        </p:txBody>
-      </p:sp>
-      <p:sp>
-        <p:nvSpPr>
-          <p:cNvPr id="6" name="Slide Number Placeholder 5">
-            <a:extLst>
-              <a:ext uri="{FF2B5EF4-FFF2-40B4-BE49-F238E27FC236}">
-                <a16:creationId xmlns:a16="http://schemas.microsoft.com/office/drawing/2014/main" id="{1BEF0E49-62B5-488C-B988-BDE7F7F305F8}"/>
-              </a:ext>
-            </a:extLst>
-          </p:cNvPr>
-          <p:cNvSpPr>
-            <a:spLocks noGrp="1"/>
-          </p:cNvSpPr>
-          <p:nvPr>
-            <p:ph type="sldNum" sz="quarter" idx="12"/>
-          </p:nvPr>
-        </p:nvSpPr>
-        <p:spPr>
-          <a:xfrm>
-            <a:off x="8990106" y="6416675"/>
-            <a:ext cx="2743200" cy="365125"/>
-          </a:xfrm>
-        </p:spPr>
-        <p:txBody>
-          <a:bodyPr/>
-          <a:lstStyle/>
-          <a:p>
-            <a:fld id="{73B850FF-6169-4056-8077-06FFA93A5366}" type="slidenum">
-              <a:rPr lang="en-US" smtClean="0"/>
-              <a:pPr/>
-              <a:t>12</a:t>
-            </a:fld>
-            <a:endParaRPr lang="en-US" dirty="0"/>
-          </a:p>
-        </p:txBody>
-      </p:sp>
-    </p:spTree>
-    <p:extLst>
-      <p:ext uri="{BB962C8B-B14F-4D97-AF65-F5344CB8AC3E}">
-        <p14:creationId xmlns:p14="http://schemas.microsoft.com/office/powerpoint/2010/main" val="1134536130"/>
-      </p:ext>
-    </p:extLst>
-  </p:cSld>
-  <p:clrMapOvr>
-    <a:masterClrMapping/>
-  </p:clrMapOvr>
-</p:sld>
-</file>
-
-<file path=ppt/slides/slide16.xml><?xml version="1.0" encoding="utf-8"?>
-<p:sld xmlns:a="http://schemas.openxmlformats.org/drawingml/2006/main" xmlns:r="http://schemas.openxmlformats.org/officeDocument/2006/relationships" xmlns:p="http://schemas.openxmlformats.org/presentationml/2006/main">
-  <p:cSld>
-    <p:spTree>
-      <p:nvGrpSpPr>
-        <p:cNvPr id="1" name=""/>
-        <p:cNvGrpSpPr/>
-        <p:nvPr/>
-      </p:nvGrpSpPr>
-      <p:grpSpPr>
-        <a:xfrm>
-          <a:off x="0" y="0"/>
-          <a:ext cx="0" cy="0"/>
-          <a:chOff x="0" y="0"/>
-          <a:chExt cx="0" cy="0"/>
-        </a:xfrm>
-      </p:grpSpPr>
-      <p:sp>
-        <p:nvSpPr>
-          <p:cNvPr id="2" name="Title 1">
-            <a:extLst>
-              <a:ext uri="{FF2B5EF4-FFF2-40B4-BE49-F238E27FC236}">
                 <a16:creationId xmlns:a16="http://schemas.microsoft.com/office/drawing/2014/main" id="{C50DDE03-5881-4143-92C0-900FD2200E97}"/>
               </a:ext>
             </a:extLst>
@@ -12603,11 +11697,13 @@
           </a:xfrm>
         </p:spPr>
         <p:txBody>
-          <a:bodyPr/>
+          <a:bodyPr>
+            <a:normAutofit/>
+          </a:bodyPr>
           <a:lstStyle/>
           <a:p>
             <a:r>
-              <a:rPr lang="en-US" dirty="0"/>
+              <a:rPr lang="en-US" sz="4000" dirty="0"/>
               <a:t>Presentation title</a:t>
             </a:r>
           </a:p>
@@ -12693,7 +11789,7 @@
 </p:sld>
 </file>
 
-<file path=ppt/slides/slide23.xml><?xml version="1.0" encoding="utf-8"?>
+<file path=ppt/slides/slide10.xml><?xml version="1.0" encoding="utf-8"?>
 <p:sld xmlns:a="http://schemas.openxmlformats.org/drawingml/2006/main" xmlns:r="http://schemas.openxmlformats.org/officeDocument/2006/relationships" xmlns:p="http://schemas.openxmlformats.org/presentationml/2006/main">
   <p:cSld>
     <p:spTree>
@@ -12715,7 +11811,7 @@
           <p:cNvPr id="2" name="Title 1">
             <a:extLst>
               <a:ext uri="{FF2B5EF4-FFF2-40B4-BE49-F238E27FC236}">
-                <a16:creationId xmlns:a16="http://schemas.microsoft.com/office/drawing/2014/main" id="{695BB7C9-365A-47FF-90E1-6016251BBD01}"/>
+                <a16:creationId xmlns:a16="http://schemas.microsoft.com/office/drawing/2014/main" id="{F3DB2667-6866-49FD-94D8-EA18D1E2E4FC}"/>
               </a:ext>
             </a:extLst>
           </p:cNvPr>
@@ -12728,8 +11824,8 @@
         </p:nvSpPr>
         <p:spPr>
           <a:xfrm>
-            <a:off x="1143000" y="990599"/>
-            <a:ext cx="4953000" cy="2130552"/>
+            <a:off x="458694" y="365125"/>
+            <a:ext cx="11274612" cy="1325563"/>
           </a:xfrm>
         </p:spPr>
         <p:txBody>
@@ -12738,144 +11834,248 @@
           <a:p>
             <a:r>
               <a:rPr lang="en-US" dirty="0"/>
-              <a:t>Agenda</a:t>
-            </a:r>
-          </a:p>
-        </p:txBody>
-      </p:sp>
-      <p:sp>
-        <p:nvSpPr>
-          <p:cNvPr id="3" name="Content Placeholder 2">
-            <a:extLst>
-              <a:ext uri="{FF2B5EF4-FFF2-40B4-BE49-F238E27FC236}">
-                <a16:creationId xmlns:a16="http://schemas.microsoft.com/office/drawing/2014/main" id="{186DD3DD-072F-4103-B534-27A7CD671D9A}"/>
-              </a:ext>
-            </a:extLst>
-          </p:cNvPr>
-          <p:cNvSpPr>
-            <a:spLocks noGrp="1"/>
-          </p:cNvSpPr>
-          <p:nvPr>
-            <p:ph idx="1"/>
+              <a:t>Additional content</a:t>
+            </a:r>
+          </a:p>
+        </p:txBody>
+      </p:sp>
+      <p:sp>
+        <p:nvSpPr>
+          <p:cNvPr id="3" name="Text Placeholder 2">
+            <a:extLst>
+              <a:ext uri="{FF2B5EF4-FFF2-40B4-BE49-F238E27FC236}">
+                <a16:creationId xmlns:a16="http://schemas.microsoft.com/office/drawing/2014/main" id="{2BF5C676-1CD3-4A4B-BC5B-2E8A3ED1C730}"/>
+              </a:ext>
+            </a:extLst>
+          </p:cNvPr>
+          <p:cNvSpPr>
+            <a:spLocks noGrp="1"/>
+          </p:cNvSpPr>
+          <p:nvPr>
+            <p:ph type="body" idx="1"/>
           </p:nvPr>
         </p:nvSpPr>
         <p:spPr>
           <a:xfrm>
-            <a:off x="1143000" y="3352800"/>
-            <a:ext cx="4953000" cy="2514600"/>
+            <a:off x="465256" y="1752600"/>
+            <a:ext cx="3291840" cy="823912"/>
           </a:xfrm>
         </p:spPr>
         <p:txBody>
+          <a:bodyPr/>
+          <a:lstStyle/>
+          <a:p>
+            <a:r>
+              <a:rPr lang="en-US" dirty="0"/>
+              <a:t>Subtitle	</a:t>
+            </a:r>
+          </a:p>
+        </p:txBody>
+      </p:sp>
+      <p:sp>
+        <p:nvSpPr>
+          <p:cNvPr id="4" name="Content Placeholder 3">
+            <a:extLst>
+              <a:ext uri="{FF2B5EF4-FFF2-40B4-BE49-F238E27FC236}">
+                <a16:creationId xmlns:a16="http://schemas.microsoft.com/office/drawing/2014/main" id="{D877F40A-D6F5-43ED-8AD0-77021456CF70}"/>
+              </a:ext>
+            </a:extLst>
+          </p:cNvPr>
+          <p:cNvSpPr>
+            <a:spLocks noGrp="1"/>
+          </p:cNvSpPr>
+          <p:nvPr>
+            <p:ph sz="half" idx="2"/>
+          </p:nvPr>
+        </p:nvSpPr>
+        <p:spPr>
+          <a:xfrm>
+            <a:off x="465256" y="2666999"/>
+            <a:ext cx="3291840" cy="3522663"/>
+          </a:xfrm>
+        </p:spPr>
+        <p:txBody>
           <a:bodyPr>
-            <a:normAutofit fontScale="92500" lnSpcReduction="20000"/>
+            <a:normAutofit/>
           </a:bodyPr>
           <a:lstStyle/>
           <a:p>
             <a:r>
               <a:rPr lang="en-US" dirty="0"/>
-              <a:t>Topic one</a:t>
+              <a:t>Add text, images, art, and videos. </a:t>
             </a:r>
           </a:p>
           <a:p>
             <a:r>
               <a:rPr lang="en-US" dirty="0"/>
-              <a:t>Topic two</a:t>
+              <a:t>Add transitions, animations, and motion. </a:t>
             </a:r>
           </a:p>
           <a:p>
             <a:r>
               <a:rPr lang="en-US" dirty="0"/>
-              <a:t>Topic three</a:t>
-            </a:r>
-          </a:p>
-          <a:p>
-            <a:r>
-              <a:rPr lang="en-US" dirty="0"/>
-              <a:t>Topic four</a:t>
-            </a:r>
-          </a:p>
-          <a:p>
-            <a:r>
-              <a:rPr lang="en-US" dirty="0"/>
-              <a:t>Topic five</a:t>
-            </a:r>
-          </a:p>
-        </p:txBody>
-      </p:sp>
-      <p:pic>
-        <p:nvPicPr>
-          <p:cNvPr id="7" name="Picture Placeholder 6" descr="A hand holding a sign">
-            <a:extLst>
-              <a:ext uri="{FF2B5EF4-FFF2-40B4-BE49-F238E27FC236}">
-                <a16:creationId xmlns:a16="http://schemas.microsoft.com/office/drawing/2014/main" id="{FBA8EE09-C66B-4072-B4E9-9DEE8394E20D}"/>
-              </a:ext>
-            </a:extLst>
-          </p:cNvPr>
-          <p:cNvPicPr>
-            <a:picLocks noGrp="1" noChangeAspect="1"/>
-          </p:cNvPicPr>
-          <p:nvPr>
-            <p:ph type="pic" sz="quarter" idx="13"/>
-          </p:nvPr>
-        </p:nvPicPr>
-        <p:blipFill rotWithShape="1">
-          <a:blip r:embed="rId2" cstate="screen">
-            <a:extLst>
-              <a:ext uri="{28A0092B-C50C-407E-A947-70E740481C1C}">
-                <a14:useLocalDpi xmlns:a14="http://schemas.microsoft.com/office/drawing/2010/main" val="0"/>
-              </a:ext>
-            </a:extLst>
-          </a:blip>
-          <a:srcRect/>
-          <a:stretch/>
-        </p:blipFill>
+              <a:t>Save to OneDrive, to get to your presentations from your computer, tablet, or phone. </a:t>
+            </a:r>
+          </a:p>
+        </p:txBody>
+      </p:sp>
+      <p:sp>
+        <p:nvSpPr>
+          <p:cNvPr id="5" name="Text Placeholder 4">
+            <a:extLst>
+              <a:ext uri="{FF2B5EF4-FFF2-40B4-BE49-F238E27FC236}">
+                <a16:creationId xmlns:a16="http://schemas.microsoft.com/office/drawing/2014/main" id="{1DA967CB-50C2-4985-B7AF-9F120DAD513B}"/>
+              </a:ext>
+            </a:extLst>
+          </p:cNvPr>
+          <p:cNvSpPr>
+            <a:spLocks noGrp="1"/>
+          </p:cNvSpPr>
+          <p:nvPr>
+            <p:ph type="body" sz="quarter" idx="3"/>
+          </p:nvPr>
+        </p:nvSpPr>
         <p:spPr>
           <a:xfrm>
-            <a:off x="6784848" y="813816"/>
-            <a:ext cx="4617720" cy="2551176"/>
+            <a:off x="4453361" y="1752600"/>
+            <a:ext cx="3291840" cy="823912"/>
           </a:xfrm>
         </p:spPr>
-      </p:pic>
-      <p:pic>
-        <p:nvPicPr>
-          <p:cNvPr id="9" name="Picture Placeholder 8" descr="A person smiling for the camera with an apron on">
-            <a:extLst>
-              <a:ext uri="{FF2B5EF4-FFF2-40B4-BE49-F238E27FC236}">
-                <a16:creationId xmlns:a16="http://schemas.microsoft.com/office/drawing/2014/main" id="{0D6D0E59-E139-4D64-A9D8-5CA5C961F9E2}"/>
-              </a:ext>
-            </a:extLst>
-          </p:cNvPr>
-          <p:cNvPicPr>
-            <a:picLocks noGrp="1" noChangeAspect="1"/>
-          </p:cNvPicPr>
-          <p:nvPr>
-            <p:ph type="pic" sz="quarter" idx="14"/>
-          </p:nvPr>
-        </p:nvPicPr>
-        <p:blipFill rotWithShape="1">
-          <a:blip r:embed="rId3" cstate="screen">
-            <a:extLst>
-              <a:ext uri="{28A0092B-C50C-407E-A947-70E740481C1C}">
-                <a14:useLocalDpi xmlns:a14="http://schemas.microsoft.com/office/drawing/2010/main" val="0"/>
-              </a:ext>
-            </a:extLst>
-          </a:blip>
-          <a:srcRect/>
-          <a:stretch/>
-        </p:blipFill>
+        <p:txBody>
+          <a:bodyPr/>
+          <a:lstStyle/>
+          <a:p>
+            <a:r>
+              <a:rPr lang="en-US" dirty="0"/>
+              <a:t>Subtitle</a:t>
+            </a:r>
+          </a:p>
+        </p:txBody>
+      </p:sp>
+      <p:sp>
+        <p:nvSpPr>
+          <p:cNvPr id="6" name="Content Placeholder 5">
+            <a:extLst>
+              <a:ext uri="{FF2B5EF4-FFF2-40B4-BE49-F238E27FC236}">
+                <a16:creationId xmlns:a16="http://schemas.microsoft.com/office/drawing/2014/main" id="{482EF994-5030-4E07-840C-7244552D986B}"/>
+              </a:ext>
+            </a:extLst>
+          </p:cNvPr>
+          <p:cNvSpPr>
+            <a:spLocks noGrp="1"/>
+          </p:cNvSpPr>
+          <p:nvPr>
+            <p:ph sz="quarter" idx="4"/>
+          </p:nvPr>
+        </p:nvSpPr>
         <p:spPr>
           <a:xfrm>
-            <a:off x="6784848" y="3465576"/>
-            <a:ext cx="4617720" cy="2551176"/>
+            <a:off x="4453361" y="2666999"/>
+            <a:ext cx="3291840" cy="3522663"/>
           </a:xfrm>
         </p:spPr>
-      </p:pic>
-      <p:sp>
-        <p:nvSpPr>
-          <p:cNvPr id="5" name="Footer Placeholder 4">
-            <a:extLst>
-              <a:ext uri="{FF2B5EF4-FFF2-40B4-BE49-F238E27FC236}">
-                <a16:creationId xmlns:a16="http://schemas.microsoft.com/office/drawing/2014/main" id="{D12A2CC8-5849-451C-81F5-731A40CD354B}"/>
+        <p:txBody>
+          <a:bodyPr>
+            <a:normAutofit/>
+          </a:bodyPr>
+          <a:lstStyle/>
+          <a:p>
+            <a:r>
+              <a:rPr lang="en-US" dirty="0"/>
+              <a:t>Open the Design Ideas pane for instant slide makeovers. </a:t>
+            </a:r>
+          </a:p>
+          <a:p>
+            <a:r>
+              <a:rPr lang="en-US" dirty="0"/>
+              <a:t>When we have design ideas, we’ll show them to you right there.</a:t>
+            </a:r>
+          </a:p>
+        </p:txBody>
+      </p:sp>
+      <p:sp>
+        <p:nvSpPr>
+          <p:cNvPr id="7" name="Text Placeholder 6">
+            <a:extLst>
+              <a:ext uri="{FF2B5EF4-FFF2-40B4-BE49-F238E27FC236}">
+                <a16:creationId xmlns:a16="http://schemas.microsoft.com/office/drawing/2014/main" id="{4AD23BD3-930E-4738-8CE3-AD28F78749B4}"/>
+              </a:ext>
+            </a:extLst>
+          </p:cNvPr>
+          <p:cNvSpPr>
+            <a:spLocks noGrp="1"/>
+          </p:cNvSpPr>
+          <p:nvPr>
+            <p:ph type="body" sz="quarter" idx="13"/>
+          </p:nvPr>
+        </p:nvSpPr>
+        <p:spPr>
+          <a:xfrm>
+            <a:off x="8441466" y="1757319"/>
+            <a:ext cx="3291840" cy="823912"/>
+          </a:xfrm>
+        </p:spPr>
+        <p:txBody>
+          <a:bodyPr/>
+          <a:lstStyle/>
+          <a:p>
+            <a:r>
+              <a:rPr lang="en-US" dirty="0"/>
+              <a:t>Subtitle</a:t>
+            </a:r>
+          </a:p>
+        </p:txBody>
+      </p:sp>
+      <p:sp>
+        <p:nvSpPr>
+          <p:cNvPr id="8" name="Content Placeholder 7">
+            <a:extLst>
+              <a:ext uri="{FF2B5EF4-FFF2-40B4-BE49-F238E27FC236}">
+                <a16:creationId xmlns:a16="http://schemas.microsoft.com/office/drawing/2014/main" id="{40CC3728-DDD8-4CD6-A441-B8E6C24AD6C4}"/>
+              </a:ext>
+            </a:extLst>
+          </p:cNvPr>
+          <p:cNvSpPr>
+            <a:spLocks noGrp="1"/>
+          </p:cNvSpPr>
+          <p:nvPr>
+            <p:ph sz="quarter" idx="14"/>
+          </p:nvPr>
+        </p:nvSpPr>
+        <p:spPr>
+          <a:xfrm>
+            <a:off x="8441466" y="2671718"/>
+            <a:ext cx="3291840" cy="3522663"/>
+          </a:xfrm>
+        </p:spPr>
+        <p:txBody>
+          <a:bodyPr>
+            <a:noAutofit/>
+          </a:bodyPr>
+          <a:lstStyle/>
+          <a:p>
+            <a:r>
+              <a:rPr lang="en-US" dirty="0"/>
+              <a:t>This PowerPoint theme uses its own unique set of colors, fonts, and effects to create the overall look and feel of these slides. </a:t>
+            </a:r>
+          </a:p>
+          <a:p>
+            <a:r>
+              <a:rPr lang="en-US" dirty="0"/>
+              <a:t>PowerPoint has tons of themes to give your presentation just the right personality. </a:t>
+            </a:r>
+          </a:p>
+          <a:p>
+            <a:endParaRPr lang="en-US" dirty="0"/>
+          </a:p>
+        </p:txBody>
+      </p:sp>
+      <p:sp>
+        <p:nvSpPr>
+          <p:cNvPr id="10" name="Footer Placeholder 9">
+            <a:extLst>
+              <a:ext uri="{FF2B5EF4-FFF2-40B4-BE49-F238E27FC236}">
+                <a16:creationId xmlns:a16="http://schemas.microsoft.com/office/drawing/2014/main" id="{734A5D3F-D016-4901-BA4A-142F67A053A1}"/>
               </a:ext>
             </a:extLst>
           </p:cNvPr>
@@ -12905,10 +12105,10 @@
       </p:sp>
       <p:sp>
         <p:nvSpPr>
-          <p:cNvPr id="6" name="Slide Number Placeholder 5">
-            <a:extLst>
-              <a:ext uri="{FF2B5EF4-FFF2-40B4-BE49-F238E27FC236}">
-                <a16:creationId xmlns:a16="http://schemas.microsoft.com/office/drawing/2014/main" id="{3C2688BC-7E88-411A-A72F-BA96A981DF64}"/>
+          <p:cNvPr id="11" name="Slide Number Placeholder 10">
+            <a:extLst>
+              <a:ext uri="{FF2B5EF4-FFF2-40B4-BE49-F238E27FC236}">
+                <a16:creationId xmlns:a16="http://schemas.microsoft.com/office/drawing/2014/main" id="{1E86CC9B-7D25-4B39-8677-4C84DD12F5ED}"/>
               </a:ext>
             </a:extLst>
           </p:cNvPr>
@@ -12932,7 +12132,7 @@
             <a:fld id="{73B850FF-6169-4056-8077-06FFA93A5366}" type="slidenum">
               <a:rPr lang="en-US" smtClean="0"/>
               <a:pPr/>
-              <a:t>2</a:t>
+              <a:t>10</a:t>
             </a:fld>
             <a:endParaRPr lang="en-US" dirty="0"/>
           </a:p>
@@ -12941,7 +12141,7 @@
     </p:spTree>
     <p:extLst>
       <p:ext uri="{BB962C8B-B14F-4D97-AF65-F5344CB8AC3E}">
-        <p14:creationId xmlns:p14="http://schemas.microsoft.com/office/powerpoint/2010/main" val="2205158642"/>
+        <p14:creationId xmlns:p14="http://schemas.microsoft.com/office/powerpoint/2010/main" val="3184922546"/>
       </p:ext>
     </p:extLst>
   </p:cSld>
@@ -12951,7 +12151,7 @@
 </p:sld>
 </file>
 
-<file path=ppt/slides/slide311.xml><?xml version="1.0" encoding="utf-8"?>
+<file path=ppt/slides/slide11.xml><?xml version="1.0" encoding="utf-8"?>
 <p:sld xmlns:a="http://schemas.openxmlformats.org/drawingml/2006/main" xmlns:r="http://schemas.openxmlformats.org/officeDocument/2006/relationships" xmlns:p="http://schemas.openxmlformats.org/presentationml/2006/main">
   <p:cSld>
     <p:spTree>
@@ -12970,6 +12170,810 @@
       </p:grpSpPr>
       <p:sp>
         <p:nvSpPr>
+          <p:cNvPr id="2" name="Title 1">
+            <a:extLst>
+              <a:ext uri="{FF2B5EF4-FFF2-40B4-BE49-F238E27FC236}">
+                <a16:creationId xmlns:a16="http://schemas.microsoft.com/office/drawing/2014/main" id="{47BB4790-9373-45EB-B7D9-55C919806E04}"/>
+              </a:ext>
+            </a:extLst>
+          </p:cNvPr>
+          <p:cNvSpPr>
+            <a:spLocks noGrp="1"/>
+          </p:cNvSpPr>
+          <p:nvPr>
+            <p:ph type="title"/>
+          </p:nvPr>
+        </p:nvSpPr>
+        <p:spPr>
+          <a:xfrm>
+            <a:off x="838200" y="393192"/>
+            <a:ext cx="4524956" cy="2130552"/>
+          </a:xfrm>
+        </p:spPr>
+        <p:txBody>
+          <a:bodyPr/>
+          <a:lstStyle/>
+          <a:p>
+            <a:r>
+              <a:rPr lang="en-US" dirty="0"/>
+              <a:t>Summary</a:t>
+            </a:r>
+          </a:p>
+        </p:txBody>
+      </p:sp>
+      <p:sp>
+        <p:nvSpPr>
+          <p:cNvPr id="3" name="Content Placeholder 2">
+            <a:extLst>
+              <a:ext uri="{FF2B5EF4-FFF2-40B4-BE49-F238E27FC236}">
+                <a16:creationId xmlns:a16="http://schemas.microsoft.com/office/drawing/2014/main" id="{B1D0CE80-526E-48B1-B2DA-C85E67C0F85C}"/>
+              </a:ext>
+            </a:extLst>
+          </p:cNvPr>
+          <p:cNvSpPr>
+            <a:spLocks noGrp="1"/>
+          </p:cNvSpPr>
+          <p:nvPr>
+            <p:ph idx="1"/>
+          </p:nvPr>
+        </p:nvSpPr>
+        <p:spPr>
+          <a:xfrm>
+            <a:off x="838200" y="2727297"/>
+            <a:ext cx="4524664" cy="3412969"/>
+          </a:xfrm>
+        </p:spPr>
+        <p:txBody>
+          <a:bodyPr anchor="t" anchorCtr="0">
+            <a:noAutofit/>
+          </a:bodyPr>
+          <a:lstStyle/>
+          <a:p>
+            <a:r>
+              <a:rPr lang="en-US" dirty="0"/>
+              <a:t>With PowerPoint, you can create presentations and share your work with others, wherever they are. Type the text you want here to get started. You can also add images, art, and videos on this template. Save to OneDrive and access your presentations from your computer, tablet, or phone. </a:t>
+            </a:r>
+          </a:p>
+        </p:txBody>
+      </p:sp>
+      <p:pic>
+        <p:nvPicPr>
+          <p:cNvPr id="11" name="Picture Placeholder 10" descr="A hand holding a sign">
+            <a:extLst>
+              <a:ext uri="{FF2B5EF4-FFF2-40B4-BE49-F238E27FC236}">
+                <a16:creationId xmlns:a16="http://schemas.microsoft.com/office/drawing/2014/main" id="{D2E14100-F835-4C99-9055-0F12058286DE}"/>
+              </a:ext>
+            </a:extLst>
+          </p:cNvPr>
+          <p:cNvPicPr>
+            <a:picLocks noGrp="1" noChangeAspect="1"/>
+          </p:cNvPicPr>
+          <p:nvPr>
+            <p:ph type="pic" sz="quarter" idx="13"/>
+          </p:nvPr>
+        </p:nvPicPr>
+        <p:blipFill rotWithShape="1">
+          <a:blip r:embed="rId2" cstate="screen">
+            <a:extLst>
+              <a:ext uri="{28A0092B-C50C-407E-A947-70E740481C1C}">
+                <a14:useLocalDpi xmlns:a14="http://schemas.microsoft.com/office/drawing/2010/main" val="0"/>
+              </a:ext>
+            </a:extLst>
+          </a:blip>
+          <a:srcRect/>
+          <a:stretch/>
+        </p:blipFill>
+        <p:spPr>
+          <a:xfrm>
+            <a:off x="5879592" y="740664"/>
+            <a:ext cx="2798762" cy="2606040"/>
+          </a:xfrm>
+        </p:spPr>
+      </p:pic>
+      <p:pic>
+        <p:nvPicPr>
+          <p:cNvPr id="13" name="Picture Placeholder 12" descr="A person cutting flowers">
+            <a:extLst>
+              <a:ext uri="{FF2B5EF4-FFF2-40B4-BE49-F238E27FC236}">
+                <a16:creationId xmlns:a16="http://schemas.microsoft.com/office/drawing/2014/main" id="{A733BA33-AE5B-45E8-B9BD-9163D1AF1A80}"/>
+              </a:ext>
+            </a:extLst>
+          </p:cNvPr>
+          <p:cNvPicPr>
+            <a:picLocks noGrp="1" noChangeAspect="1"/>
+          </p:cNvPicPr>
+          <p:nvPr>
+            <p:ph type="pic" sz="quarter" idx="14"/>
+          </p:nvPr>
+        </p:nvPicPr>
+        <p:blipFill rotWithShape="1">
+          <a:blip r:embed="rId3" cstate="screen">
+            <a:extLst>
+              <a:ext uri="{28A0092B-C50C-407E-A947-70E740481C1C}">
+                <a14:useLocalDpi xmlns:a14="http://schemas.microsoft.com/office/drawing/2010/main" val="0"/>
+              </a:ext>
+            </a:extLst>
+          </a:blip>
+          <a:srcRect/>
+          <a:stretch/>
+        </p:blipFill>
+        <p:spPr>
+          <a:xfrm>
+            <a:off x="8878824" y="740664"/>
+            <a:ext cx="2798762" cy="2606040"/>
+          </a:xfrm>
+        </p:spPr>
+      </p:pic>
+      <p:pic>
+        <p:nvPicPr>
+          <p:cNvPr id="15" name="Picture Placeholder 14" descr="A bunch of flowers">
+            <a:extLst>
+              <a:ext uri="{FF2B5EF4-FFF2-40B4-BE49-F238E27FC236}">
+                <a16:creationId xmlns:a16="http://schemas.microsoft.com/office/drawing/2014/main" id="{97330ACA-B8F2-4749-A572-895C6975B433}"/>
+              </a:ext>
+            </a:extLst>
+          </p:cNvPr>
+          <p:cNvPicPr>
+            <a:picLocks noGrp="1" noChangeAspect="1"/>
+          </p:cNvPicPr>
+          <p:nvPr>
+            <p:ph type="pic" sz="quarter" idx="15"/>
+          </p:nvPr>
+        </p:nvPicPr>
+        <p:blipFill rotWithShape="1">
+          <a:blip r:embed="rId4" cstate="screen">
+            <a:extLst>
+              <a:ext uri="{28A0092B-C50C-407E-A947-70E740481C1C}">
+                <a14:useLocalDpi xmlns:a14="http://schemas.microsoft.com/office/drawing/2010/main" val="0"/>
+              </a:ext>
+            </a:extLst>
+          </a:blip>
+          <a:srcRect/>
+          <a:stretch/>
+        </p:blipFill>
+        <p:spPr>
+          <a:xfrm>
+            <a:off x="5879592" y="3529584"/>
+            <a:ext cx="2798762" cy="2606040"/>
+          </a:xfrm>
+        </p:spPr>
+      </p:pic>
+      <p:pic>
+        <p:nvPicPr>
+          <p:cNvPr id="17" name="Picture Placeholder 16" descr="A person smiling for the camera with an apron on">
+            <a:extLst>
+              <a:ext uri="{FF2B5EF4-FFF2-40B4-BE49-F238E27FC236}">
+                <a16:creationId xmlns:a16="http://schemas.microsoft.com/office/drawing/2014/main" id="{CE0F719B-40D6-4669-945A-BF20CF680BCD}"/>
+              </a:ext>
+            </a:extLst>
+          </p:cNvPr>
+          <p:cNvPicPr>
+            <a:picLocks noGrp="1" noChangeAspect="1"/>
+          </p:cNvPicPr>
+          <p:nvPr>
+            <p:ph type="pic" sz="quarter" idx="16"/>
+          </p:nvPr>
+        </p:nvPicPr>
+        <p:blipFill rotWithShape="1">
+          <a:blip r:embed="rId5" cstate="screen">
+            <a:extLst>
+              <a:ext uri="{28A0092B-C50C-407E-A947-70E740481C1C}">
+                <a14:useLocalDpi xmlns:a14="http://schemas.microsoft.com/office/drawing/2010/main" val="0"/>
+              </a:ext>
+            </a:extLst>
+          </a:blip>
+          <a:srcRect/>
+          <a:stretch/>
+        </p:blipFill>
+        <p:spPr>
+          <a:xfrm>
+            <a:off x="8869680" y="3529584"/>
+            <a:ext cx="2798762" cy="2606040"/>
+          </a:xfrm>
+        </p:spPr>
+      </p:pic>
+      <p:sp>
+        <p:nvSpPr>
+          <p:cNvPr id="5" name="Footer Placeholder 4">
+            <a:extLst>
+              <a:ext uri="{FF2B5EF4-FFF2-40B4-BE49-F238E27FC236}">
+                <a16:creationId xmlns:a16="http://schemas.microsoft.com/office/drawing/2014/main" id="{FB47D7BA-5863-41A3-B873-B1DB20B8F6E7}"/>
+              </a:ext>
+            </a:extLst>
+          </p:cNvPr>
+          <p:cNvSpPr>
+            <a:spLocks noGrp="1"/>
+          </p:cNvSpPr>
+          <p:nvPr>
+            <p:ph type="ftr" sz="quarter" idx="11"/>
+          </p:nvPr>
+        </p:nvSpPr>
+        <p:spPr>
+          <a:xfrm>
+            <a:off x="4038600" y="6416675"/>
+            <a:ext cx="4114800" cy="365125"/>
+          </a:xfrm>
+        </p:spPr>
+        <p:txBody>
+          <a:bodyPr/>
+          <a:lstStyle/>
+          <a:p>
+            <a:r>
+              <a:rPr lang="en-US" dirty="0"/>
+              <a:t>Sample Footer Text</a:t>
+            </a:r>
+          </a:p>
+        </p:txBody>
+      </p:sp>
+      <p:sp>
+        <p:nvSpPr>
+          <p:cNvPr id="6" name="Slide Number Placeholder 5">
+            <a:extLst>
+              <a:ext uri="{FF2B5EF4-FFF2-40B4-BE49-F238E27FC236}">
+                <a16:creationId xmlns:a16="http://schemas.microsoft.com/office/drawing/2014/main" id="{02CB87F6-DDB9-4203-B293-91A0DBC60A45}"/>
+              </a:ext>
+            </a:extLst>
+          </p:cNvPr>
+          <p:cNvSpPr>
+            <a:spLocks noGrp="1"/>
+          </p:cNvSpPr>
+          <p:nvPr>
+            <p:ph type="sldNum" sz="quarter" idx="12"/>
+          </p:nvPr>
+        </p:nvSpPr>
+        <p:spPr>
+          <a:xfrm>
+            <a:off x="8990106" y="6416675"/>
+            <a:ext cx="2743200" cy="365125"/>
+          </a:xfrm>
+        </p:spPr>
+        <p:txBody>
+          <a:bodyPr/>
+          <a:lstStyle/>
+          <a:p>
+            <a:fld id="{73B850FF-6169-4056-8077-06FFA93A5366}" type="slidenum">
+              <a:rPr lang="en-US" smtClean="0"/>
+              <a:pPr/>
+              <a:t>11</a:t>
+            </a:fld>
+            <a:endParaRPr lang="en-US" dirty="0"/>
+          </a:p>
+        </p:txBody>
+      </p:sp>
+    </p:spTree>
+    <p:extLst>
+      <p:ext uri="{BB962C8B-B14F-4D97-AF65-F5344CB8AC3E}">
+        <p14:creationId xmlns:p14="http://schemas.microsoft.com/office/powerpoint/2010/main" val="1349847217"/>
+      </p:ext>
+    </p:extLst>
+  </p:cSld>
+  <p:clrMapOvr>
+    <a:masterClrMapping/>
+  </p:clrMapOvr>
+</p:sld>
+</file>
+
+<file path=ppt/slides/slide12.xml><?xml version="1.0" encoding="utf-8"?>
+<p:sld xmlns:a="http://schemas.openxmlformats.org/drawingml/2006/main" xmlns:r="http://schemas.openxmlformats.org/officeDocument/2006/relationships" xmlns:p="http://schemas.openxmlformats.org/presentationml/2006/main">
+  <p:cSld>
+    <p:spTree>
+      <p:nvGrpSpPr>
+        <p:cNvPr id="1" name=""/>
+        <p:cNvGrpSpPr/>
+        <p:nvPr/>
+      </p:nvGrpSpPr>
+      <p:grpSpPr>
+        <a:xfrm>
+          <a:off x="0" y="0"/>
+          <a:ext cx="0" cy="0"/>
+          <a:chOff x="0" y="0"/>
+          <a:chExt cx="0" cy="0"/>
+        </a:xfrm>
+      </p:grpSpPr>
+      <p:sp>
+        <p:nvSpPr>
+          <p:cNvPr id="2" name="Title 1">
+            <a:extLst>
+              <a:ext uri="{FF2B5EF4-FFF2-40B4-BE49-F238E27FC236}">
+                <a16:creationId xmlns:a16="http://schemas.microsoft.com/office/drawing/2014/main" id="{515381D8-DFFF-4518-A87C-2FF7F02CCDA1}"/>
+              </a:ext>
+            </a:extLst>
+          </p:cNvPr>
+          <p:cNvSpPr>
+            <a:spLocks noGrp="1"/>
+          </p:cNvSpPr>
+          <p:nvPr>
+            <p:ph type="ctrTitle"/>
+          </p:nvPr>
+        </p:nvSpPr>
+        <p:spPr>
+          <a:xfrm>
+            <a:off x="996275" y="394623"/>
+            <a:ext cx="5996619" cy="2131033"/>
+          </a:xfrm>
+        </p:spPr>
+        <p:txBody>
+          <a:bodyPr/>
+          <a:lstStyle/>
+          <a:p>
+            <a:r>
+              <a:rPr lang="en-US" dirty="0"/>
+              <a:t>Thank you</a:t>
+            </a:r>
+          </a:p>
+        </p:txBody>
+      </p:sp>
+      <p:sp>
+        <p:nvSpPr>
+          <p:cNvPr id="3" name="Subtitle 2">
+            <a:extLst>
+              <a:ext uri="{FF2B5EF4-FFF2-40B4-BE49-F238E27FC236}">
+                <a16:creationId xmlns:a16="http://schemas.microsoft.com/office/drawing/2014/main" id="{4DF80084-FC54-42F2-9B3A-553D97B02633}"/>
+              </a:ext>
+            </a:extLst>
+          </p:cNvPr>
+          <p:cNvSpPr>
+            <a:spLocks noGrp="1"/>
+          </p:cNvSpPr>
+          <p:nvPr>
+            <p:ph type="subTitle" idx="1"/>
+          </p:nvPr>
+        </p:nvSpPr>
+        <p:spPr>
+          <a:xfrm>
+            <a:off x="7185429" y="381000"/>
+            <a:ext cx="3997745" cy="2133600"/>
+          </a:xfrm>
+        </p:spPr>
+        <p:txBody>
+          <a:bodyPr/>
+          <a:lstStyle/>
+          <a:p>
+            <a:r>
+              <a:rPr lang="en-US" dirty="0"/>
+              <a:t>Presenter name</a:t>
+            </a:r>
+          </a:p>
+          <a:p>
+            <a:r>
+              <a:rPr lang="en-US" dirty="0"/>
+              <a:t>Email address</a:t>
+            </a:r>
+          </a:p>
+          <a:p>
+            <a:r>
+              <a:rPr lang="en-US" dirty="0"/>
+              <a:t>Website</a:t>
+            </a:r>
+          </a:p>
+        </p:txBody>
+      </p:sp>
+      <p:pic>
+        <p:nvPicPr>
+          <p:cNvPr id="7" name="Picture Placeholder 6" descr="A person boxing flowers">
+            <a:extLst>
+              <a:ext uri="{FF2B5EF4-FFF2-40B4-BE49-F238E27FC236}">
+                <a16:creationId xmlns:a16="http://schemas.microsoft.com/office/drawing/2014/main" id="{5BF31D2B-C056-4DF4-B56D-B79671C937B5}"/>
+              </a:ext>
+            </a:extLst>
+          </p:cNvPr>
+          <p:cNvPicPr>
+            <a:picLocks noGrp="1" noChangeAspect="1"/>
+          </p:cNvPicPr>
+          <p:nvPr>
+            <p:ph type="pic" sz="quarter" idx="13"/>
+          </p:nvPr>
+        </p:nvPicPr>
+        <p:blipFill rotWithShape="1">
+          <a:blip r:embed="rId2" cstate="screen">
+            <a:extLst>
+              <a:ext uri="{28A0092B-C50C-407E-A947-70E740481C1C}">
+                <a14:useLocalDpi xmlns:a14="http://schemas.microsoft.com/office/drawing/2010/main" val="0"/>
+              </a:ext>
+            </a:extLst>
+          </a:blip>
+          <a:srcRect/>
+          <a:stretch/>
+        </p:blipFill>
+        <p:spPr>
+          <a:xfrm>
+            <a:off x="813816" y="2670048"/>
+            <a:ext cx="5175504" cy="3639312"/>
+          </a:xfrm>
+        </p:spPr>
+      </p:pic>
+      <p:pic>
+        <p:nvPicPr>
+          <p:cNvPr id="9" name="Picture Placeholder 8" descr="A basket of flowers">
+            <a:extLst>
+              <a:ext uri="{FF2B5EF4-FFF2-40B4-BE49-F238E27FC236}">
+                <a16:creationId xmlns:a16="http://schemas.microsoft.com/office/drawing/2014/main" id="{18FA2AC7-49CD-49AE-8CF7-9D33C8C4E739}"/>
+              </a:ext>
+            </a:extLst>
+          </p:cNvPr>
+          <p:cNvPicPr>
+            <a:picLocks noGrp="1" noChangeAspect="1"/>
+          </p:cNvPicPr>
+          <p:nvPr>
+            <p:ph type="pic" sz="quarter" idx="14"/>
+          </p:nvPr>
+        </p:nvPicPr>
+        <p:blipFill rotWithShape="1">
+          <a:blip r:embed="rId3" cstate="screen">
+            <a:extLst>
+              <a:ext uri="{28A0092B-C50C-407E-A947-70E740481C1C}">
+                <a14:useLocalDpi xmlns:a14="http://schemas.microsoft.com/office/drawing/2010/main" val="0"/>
+              </a:ext>
+            </a:extLst>
+          </a:blip>
+          <a:srcRect/>
+          <a:stretch/>
+        </p:blipFill>
+        <p:spPr>
+          <a:xfrm>
+            <a:off x="6190488" y="2670048"/>
+            <a:ext cx="5175504" cy="3639312"/>
+          </a:xfrm>
+        </p:spPr>
+      </p:pic>
+      <p:sp>
+        <p:nvSpPr>
+          <p:cNvPr id="5" name="Footer Placeholder 4">
+            <a:extLst>
+              <a:ext uri="{FF2B5EF4-FFF2-40B4-BE49-F238E27FC236}">
+                <a16:creationId xmlns:a16="http://schemas.microsoft.com/office/drawing/2014/main" id="{6346BE14-BD4F-4DBD-9B58-FC4C6EC5D2B9}"/>
+              </a:ext>
+            </a:extLst>
+          </p:cNvPr>
+          <p:cNvSpPr>
+            <a:spLocks noGrp="1"/>
+          </p:cNvSpPr>
+          <p:nvPr>
+            <p:ph type="ftr" sz="quarter" idx="11"/>
+          </p:nvPr>
+        </p:nvSpPr>
+        <p:spPr>
+          <a:xfrm>
+            <a:off x="4038600" y="6416675"/>
+            <a:ext cx="4114800" cy="365125"/>
+          </a:xfrm>
+        </p:spPr>
+        <p:txBody>
+          <a:bodyPr/>
+          <a:lstStyle/>
+          <a:p>
+            <a:r>
+              <a:rPr lang="en-US" dirty="0"/>
+              <a:t>Sample Footer Text</a:t>
+            </a:r>
+          </a:p>
+        </p:txBody>
+      </p:sp>
+      <p:sp>
+        <p:nvSpPr>
+          <p:cNvPr id="6" name="Slide Number Placeholder 5">
+            <a:extLst>
+              <a:ext uri="{FF2B5EF4-FFF2-40B4-BE49-F238E27FC236}">
+                <a16:creationId xmlns:a16="http://schemas.microsoft.com/office/drawing/2014/main" id="{1BEF0E49-62B5-488C-B988-BDE7F7F305F8}"/>
+              </a:ext>
+            </a:extLst>
+          </p:cNvPr>
+          <p:cNvSpPr>
+            <a:spLocks noGrp="1"/>
+          </p:cNvSpPr>
+          <p:nvPr>
+            <p:ph type="sldNum" sz="quarter" idx="12"/>
+          </p:nvPr>
+        </p:nvSpPr>
+        <p:spPr>
+          <a:xfrm>
+            <a:off x="8990106" y="6416675"/>
+            <a:ext cx="2743200" cy="365125"/>
+          </a:xfrm>
+        </p:spPr>
+        <p:txBody>
+          <a:bodyPr/>
+          <a:lstStyle/>
+          <a:p>
+            <a:fld id="{73B850FF-6169-4056-8077-06FFA93A5366}" type="slidenum">
+              <a:rPr lang="en-US" smtClean="0"/>
+              <a:pPr/>
+              <a:t>12</a:t>
+            </a:fld>
+            <a:endParaRPr lang="en-US" dirty="0"/>
+          </a:p>
+        </p:txBody>
+      </p:sp>
+    </p:spTree>
+    <p:extLst>
+      <p:ext uri="{BB962C8B-B14F-4D97-AF65-F5344CB8AC3E}">
+        <p14:creationId xmlns:p14="http://schemas.microsoft.com/office/powerpoint/2010/main" val="1134536130"/>
+      </p:ext>
+    </p:extLst>
+  </p:cSld>
+  <p:clrMapOvr>
+    <a:masterClrMapping/>
+  </p:clrMapOvr>
+</p:sld>
+</file>
+
+<file path=ppt/slides/slide2.xml><?xml version="1.0" encoding="utf-8"?>
+<p:sld xmlns:a="http://schemas.openxmlformats.org/drawingml/2006/main" xmlns:r="http://schemas.openxmlformats.org/officeDocument/2006/relationships" xmlns:p="http://schemas.openxmlformats.org/presentationml/2006/main">
+  <p:cSld>
+    <p:spTree>
+      <p:nvGrpSpPr>
+        <p:cNvPr id="1" name=""/>
+        <p:cNvGrpSpPr/>
+        <p:nvPr/>
+      </p:nvGrpSpPr>
+      <p:grpSpPr>
+        <a:xfrm>
+          <a:off x="0" y="0"/>
+          <a:ext cx="0" cy="0"/>
+          <a:chOff x="0" y="0"/>
+          <a:chExt cx="0" cy="0"/>
+        </a:xfrm>
+      </p:grpSpPr>
+      <p:sp>
+        <p:nvSpPr>
+          <p:cNvPr id="2" name="Title 1">
+            <a:extLst>
+              <a:ext uri="{FF2B5EF4-FFF2-40B4-BE49-F238E27FC236}">
+                <a16:creationId xmlns:a16="http://schemas.microsoft.com/office/drawing/2014/main" id="{695BB7C9-365A-47FF-90E1-6016251BBD01}"/>
+              </a:ext>
+            </a:extLst>
+          </p:cNvPr>
+          <p:cNvSpPr>
+            <a:spLocks noGrp="1"/>
+          </p:cNvSpPr>
+          <p:nvPr>
+            <p:ph type="title"/>
+          </p:nvPr>
+        </p:nvSpPr>
+        <p:spPr>
+          <a:xfrm>
+            <a:off x="1143000" y="990599"/>
+            <a:ext cx="4953000" cy="2130552"/>
+          </a:xfrm>
+        </p:spPr>
+        <p:txBody>
+          <a:bodyPr/>
+          <a:lstStyle/>
+          <a:p>
+            <a:r>
+              <a:rPr lang="en-US" dirty="0"/>
+              <a:t>Agenda</a:t>
+            </a:r>
+          </a:p>
+        </p:txBody>
+      </p:sp>
+      <p:sp>
+        <p:nvSpPr>
+          <p:cNvPr id="3" name="Content Placeholder 2">
+            <a:extLst>
+              <a:ext uri="{FF2B5EF4-FFF2-40B4-BE49-F238E27FC236}">
+                <a16:creationId xmlns:a16="http://schemas.microsoft.com/office/drawing/2014/main" id="{186DD3DD-072F-4103-B534-27A7CD671D9A}"/>
+              </a:ext>
+            </a:extLst>
+          </p:cNvPr>
+          <p:cNvSpPr>
+            <a:spLocks noGrp="1"/>
+          </p:cNvSpPr>
+          <p:nvPr>
+            <p:ph idx="1"/>
+          </p:nvPr>
+        </p:nvSpPr>
+        <p:spPr>
+          <a:xfrm>
+            <a:off x="1143000" y="3352800"/>
+            <a:ext cx="4953000" cy="2514600"/>
+          </a:xfrm>
+        </p:spPr>
+        <p:txBody>
+          <a:bodyPr>
+            <a:normAutofit/>
+          </a:bodyPr>
+          <a:lstStyle/>
+          <a:p>
+            <a:r>
+              <a:rPr lang="en-US" dirty="0"/>
+              <a:t>Topic one</a:t>
+            </a:r>
+          </a:p>
+          <a:p>
+            <a:r>
+              <a:rPr lang="en-US" dirty="0"/>
+              <a:t>Topic two</a:t>
+            </a:r>
+          </a:p>
+          <a:p>
+            <a:r>
+              <a:rPr lang="en-US" dirty="0"/>
+              <a:t>Topic three</a:t>
+            </a:r>
+          </a:p>
+          <a:p>
+            <a:r>
+              <a:rPr lang="en-US" dirty="0"/>
+              <a:t>Topic four</a:t>
+            </a:r>
+          </a:p>
+          <a:p>
+            <a:r>
+              <a:rPr lang="en-US" dirty="0"/>
+              <a:t>Topic five</a:t>
+            </a:r>
+          </a:p>
+        </p:txBody>
+      </p:sp>
+      <p:pic>
+        <p:nvPicPr>
+          <p:cNvPr id="7" name="Picture Placeholder 6" descr="A hand holding a sign">
+            <a:extLst>
+              <a:ext uri="{FF2B5EF4-FFF2-40B4-BE49-F238E27FC236}">
+                <a16:creationId xmlns:a16="http://schemas.microsoft.com/office/drawing/2014/main" id="{FBA8EE09-C66B-4072-B4E9-9DEE8394E20D}"/>
+              </a:ext>
+            </a:extLst>
+          </p:cNvPr>
+          <p:cNvPicPr>
+            <a:picLocks noGrp="1" noChangeAspect="1"/>
+          </p:cNvPicPr>
+          <p:nvPr>
+            <p:ph type="pic" sz="quarter" idx="13"/>
+          </p:nvPr>
+        </p:nvPicPr>
+        <p:blipFill rotWithShape="1">
+          <a:blip r:embed="rId2" cstate="screen">
+            <a:extLst>
+              <a:ext uri="{28A0092B-C50C-407E-A947-70E740481C1C}">
+                <a14:useLocalDpi xmlns:a14="http://schemas.microsoft.com/office/drawing/2010/main" val="0"/>
+              </a:ext>
+            </a:extLst>
+          </a:blip>
+          <a:srcRect/>
+          <a:stretch/>
+        </p:blipFill>
+        <p:spPr>
+          <a:xfrm>
+            <a:off x="6784848" y="813816"/>
+            <a:ext cx="4617720" cy="2551176"/>
+          </a:xfrm>
+        </p:spPr>
+      </p:pic>
+      <p:pic>
+        <p:nvPicPr>
+          <p:cNvPr id="9" name="Picture Placeholder 8" descr="A person smiling for the camera with an apron on">
+            <a:extLst>
+              <a:ext uri="{FF2B5EF4-FFF2-40B4-BE49-F238E27FC236}">
+                <a16:creationId xmlns:a16="http://schemas.microsoft.com/office/drawing/2014/main" id="{0D6D0E59-E139-4D64-A9D8-5CA5C961F9E2}"/>
+              </a:ext>
+            </a:extLst>
+          </p:cNvPr>
+          <p:cNvPicPr>
+            <a:picLocks noGrp="1" noChangeAspect="1"/>
+          </p:cNvPicPr>
+          <p:nvPr>
+            <p:ph type="pic" sz="quarter" idx="14"/>
+          </p:nvPr>
+        </p:nvPicPr>
+        <p:blipFill rotWithShape="1">
+          <a:blip r:embed="rId3" cstate="screen">
+            <a:extLst>
+              <a:ext uri="{28A0092B-C50C-407E-A947-70E740481C1C}">
+                <a14:useLocalDpi xmlns:a14="http://schemas.microsoft.com/office/drawing/2010/main" val="0"/>
+              </a:ext>
+            </a:extLst>
+          </a:blip>
+          <a:srcRect/>
+          <a:stretch/>
+        </p:blipFill>
+        <p:spPr>
+          <a:xfrm>
+            <a:off x="6784848" y="3465576"/>
+            <a:ext cx="4617720" cy="2551176"/>
+          </a:xfrm>
+        </p:spPr>
+      </p:pic>
+      <p:sp>
+        <p:nvSpPr>
+          <p:cNvPr id="5" name="Footer Placeholder 4">
+            <a:extLst>
+              <a:ext uri="{FF2B5EF4-FFF2-40B4-BE49-F238E27FC236}">
+                <a16:creationId xmlns:a16="http://schemas.microsoft.com/office/drawing/2014/main" id="{D12A2CC8-5849-451C-81F5-731A40CD354B}"/>
+              </a:ext>
+            </a:extLst>
+          </p:cNvPr>
+          <p:cNvSpPr>
+            <a:spLocks noGrp="1"/>
+          </p:cNvSpPr>
+          <p:nvPr>
+            <p:ph type="ftr" sz="quarter" idx="11"/>
+          </p:nvPr>
+        </p:nvSpPr>
+        <p:spPr>
+          <a:xfrm>
+            <a:off x="4038600" y="6416675"/>
+            <a:ext cx="4114800" cy="365125"/>
+          </a:xfrm>
+        </p:spPr>
+        <p:txBody>
+          <a:bodyPr/>
+          <a:lstStyle/>
+          <a:p>
+            <a:r>
+              <a:rPr lang="en-US" dirty="0"/>
+              <a:t>Sample Footer Text</a:t>
+            </a:r>
+          </a:p>
+        </p:txBody>
+      </p:sp>
+      <p:sp>
+        <p:nvSpPr>
+          <p:cNvPr id="6" name="Slide Number Placeholder 5">
+            <a:extLst>
+              <a:ext uri="{FF2B5EF4-FFF2-40B4-BE49-F238E27FC236}">
+                <a16:creationId xmlns:a16="http://schemas.microsoft.com/office/drawing/2014/main" id="{3C2688BC-7E88-411A-A72F-BA96A981DF64}"/>
+              </a:ext>
+            </a:extLst>
+          </p:cNvPr>
+          <p:cNvSpPr>
+            <a:spLocks noGrp="1"/>
+          </p:cNvSpPr>
+          <p:nvPr>
+            <p:ph type="sldNum" sz="quarter" idx="12"/>
+          </p:nvPr>
+        </p:nvSpPr>
+        <p:spPr>
+          <a:xfrm>
+            <a:off x="8990106" y="6416675"/>
+            <a:ext cx="2743200" cy="365125"/>
+          </a:xfrm>
+        </p:spPr>
+        <p:txBody>
+          <a:bodyPr/>
+          <a:lstStyle/>
+          <a:p>
+            <a:fld id="{73B850FF-6169-4056-8077-06FFA93A5366}" type="slidenum">
+              <a:rPr lang="en-US" smtClean="0"/>
+              <a:pPr/>
+              <a:t>2</a:t>
+            </a:fld>
+            <a:endParaRPr lang="en-US" dirty="0"/>
+          </a:p>
+        </p:txBody>
+      </p:sp>
+    </p:spTree>
+    <p:extLst>
+      <p:ext uri="{BB962C8B-B14F-4D97-AF65-F5344CB8AC3E}">
+        <p14:creationId xmlns:p14="http://schemas.microsoft.com/office/powerpoint/2010/main" val="2205158642"/>
+      </p:ext>
+    </p:extLst>
+  </p:cSld>
+  <p:clrMapOvr>
+    <a:masterClrMapping/>
+  </p:clrMapOvr>
+</p:sld>
+</file>
+
+<file path=ppt/slides/slide3.xml><?xml version="1.0" encoding="utf-8"?>
+<p:sld xmlns:a="http://schemas.openxmlformats.org/drawingml/2006/main" xmlns:r="http://schemas.openxmlformats.org/officeDocument/2006/relationships" xmlns:p="http://schemas.openxmlformats.org/presentationml/2006/main">
+  <p:cSld>
+    <p:spTree>
+      <p:nvGrpSpPr>
+        <p:cNvPr id="1" name=""/>
+        <p:cNvGrpSpPr/>
+        <p:nvPr/>
+      </p:nvGrpSpPr>
+      <p:grpSpPr>
+        <a:xfrm>
+          <a:off x="0" y="0"/>
+          <a:ext cx="0" cy="0"/>
+          <a:chOff x="0" y="0"/>
+          <a:chExt cx="0" cy="0"/>
+        </a:xfrm>
+      </p:grpSpPr>
+      <p:sp>
+        <p:nvSpPr>
           <p:cNvPr id="8" name="Title 7">
             <a:extLst>
               <a:ext uri="{FF2B5EF4-FFF2-40B4-BE49-F238E27FC236}">
@@ -13025,7 +13029,7 @@
         </p:spPr>
         <p:txBody>
           <a:bodyPr>
-            <a:normAutofit fontScale="85000" lnSpcReduction="10000"/>
+            <a:normAutofit/>
           </a:bodyPr>
           <a:lstStyle/>
           <a:p>
@@ -13151,7 +13155,7 @@
 </p:sld>
 </file>
 
-<file path=ppt/slides/slide49.xml><?xml version="1.0" encoding="utf-8"?>
+<file path=ppt/slides/slide4.xml><?xml version="1.0" encoding="utf-8"?>
 <p:sld xmlns:a="http://schemas.openxmlformats.org/drawingml/2006/main" xmlns:r="http://schemas.openxmlformats.org/officeDocument/2006/relationships" xmlns:p="http://schemas.openxmlformats.org/presentationml/2006/main">
   <p:cSld>
     <p:spTree>
@@ -13349,7 +13353,7 @@
 </p:sld>
 </file>
 
-<file path=ppt/slides/slide57.xml><?xml version="1.0" encoding="utf-8"?>
+<file path=ppt/slides/slide5.xml><?xml version="1.0" encoding="utf-8"?>
 <p:sld xmlns:a="http://schemas.openxmlformats.org/drawingml/2006/main" xmlns:r="http://schemas.openxmlformats.org/officeDocument/2006/relationships" xmlns:p="http://schemas.openxmlformats.org/presentationml/2006/main">
   <p:cSld>
     <p:spTree>
@@ -14491,7 +14495,7 @@
 </p:sld>
 </file>
 
-<file path=ppt/slides/slide64.xml><?xml version="1.0" encoding="utf-8"?>
+<file path=ppt/slides/slide6.xml><?xml version="1.0" encoding="utf-8"?>
 <p:sld xmlns:a="http://schemas.openxmlformats.org/drawingml/2006/main" xmlns:r="http://schemas.openxmlformats.org/officeDocument/2006/relationships" xmlns:p="http://schemas.openxmlformats.org/presentationml/2006/main">
   <p:cSld>
     <p:spTree>
@@ -14723,7 +14727,7 @@
 </p:sld>
 </file>
 
-<file path=ppt/slides/slide71.xml><?xml version="1.0" encoding="utf-8"?>
+<file path=ppt/slides/slide7.xml><?xml version="1.0" encoding="utf-8"?>
 <p:sld xmlns:a="http://schemas.openxmlformats.org/drawingml/2006/main" xmlns:r="http://schemas.openxmlformats.org/officeDocument/2006/relationships" xmlns:p="http://schemas.openxmlformats.org/presentationml/2006/main">
   <p:cSld>
     <p:spTree>
@@ -15187,7 +15191,7 @@
 </p:sld>
 </file>
 
-<file path=ppt/slides/slide812.xml><?xml version="1.0" encoding="utf-8"?>
+<file path=ppt/slides/slide8.xml><?xml version="1.0" encoding="utf-8"?>
 <p:sld xmlns:a="http://schemas.openxmlformats.org/drawingml/2006/main" xmlns:r="http://schemas.openxmlformats.org/officeDocument/2006/relationships" xmlns:p="http://schemas.openxmlformats.org/presentationml/2006/main">
   <p:cSld>
     <p:spTree>
@@ -15334,7 +15338,7 @@
 </p:sld>
 </file>
 
-<file path=ppt/slides/slide910.xml><?xml version="1.0" encoding="utf-8"?>
+<file path=ppt/slides/slide9.xml><?xml version="1.0" encoding="utf-8"?>
 <p:sld xmlns:a="http://schemas.openxmlformats.org/drawingml/2006/main" xmlns:r="http://schemas.openxmlformats.org/officeDocument/2006/relationships" xmlns:p="http://schemas.openxmlformats.org/presentationml/2006/main">
   <p:cSld>
     <p:spTree>
@@ -15619,7 +15623,7 @@
 </p:sld>
 </file>
 
-<file path=ppt/theme/theme11.xml><?xml version="1.0" encoding="utf-8"?>
+<file path=ppt/theme/theme1.xml><?xml version="1.0" encoding="utf-8"?>
 <a:theme xmlns:a="http://schemas.openxmlformats.org/drawingml/2006/main" name="DappledVTI">
   <a:themeElements>
     <a:clrScheme name="Custom 81">
@@ -15820,7 +15824,7 @@
 </a:theme>
 </file>
 
-<file path=ppt/theme/theme22.xml><?xml version="1.0" encoding="utf-8"?>
+<file path=ppt/theme/theme2.xml><?xml version="1.0" encoding="utf-8"?>
 <a:theme xmlns:a="http://schemas.openxmlformats.org/drawingml/2006/main" name="Office Theme">
   <a:themeElements>
     <a:clrScheme name="Office">
@@ -16115,7 +16119,16 @@
 </a:theme>
 </file>
 
-<file path=customXml/item13.xml><?xml version="1.0" encoding="utf-8"?>
+<file path=customXml/item1.xml><?xml version="1.0" encoding="utf-8"?>
+<?mso-contentType ?>
+<FormTemplates xmlns="http://schemas.microsoft.com/sharepoint/v3/contenttype/forms">
+  <Display>DocumentLibraryForm</Display>
+  <Edit>DocumentLibraryForm</Edit>
+  <New>DocumentLibraryForm</New>
+</FormTemplates>
+</file>
+
+<file path=customXml/item2.xml><?xml version="1.0" encoding="utf-8"?>
 <ct:contentTypeSchema xmlns:ct="http://schemas.microsoft.com/office/2006/metadata/contentType" xmlns:ma="http://schemas.microsoft.com/office/2006/metadata/properties/metaAttributes" ct:_="" ma:_="" ma:contentTypeName="Document" ma:contentTypeID="0x01010079F111ED35F8CC479449609E8A0923A6" ma:contentTypeVersion="20" ma:contentTypeDescription="Create a new document." ma:contentTypeScope="" ma:versionID="1267097ee5f5874adfcc408041ae252e">
   <xsd:schema xmlns:xsd="http://www.w3.org/2001/XMLSchema" xmlns:xs="http://www.w3.org/2001/XMLSchema" xmlns:p="http://schemas.microsoft.com/office/2006/metadata/properties" xmlns:ns1="http://schemas.microsoft.com/sharepoint/v3" xmlns:ns2="71af3243-3dd4-4a8d-8c0d-dd76da1f02a5" xmlns:ns3="16c05727-aa75-4e4a-9b5f-8a80a1165891" xmlns:ns4="230e9df3-be65-4c73-a93b-d1236ebd677e" targetNamespace="http://schemas.microsoft.com/office/2006/metadata/properties" ma:root="true" ma:fieldsID="395891a93df65b14727750f2c06c306c" ns1:_="" ns2:_="" ns3:_="" ns4:_="">
     <xsd:import namespace="http://schemas.microsoft.com/sharepoint/v3"/>
@@ -16391,15 +16404,6 @@
 </ct:contentTypeSchema>
 </file>
 
-<file path=customXml/item22.xml><?xml version="1.0" encoding="utf-8"?>
-<?mso-contentType ?>
-<FormTemplates xmlns="http://schemas.microsoft.com/sharepoint/v3/contenttype/forms">
-  <Display>DocumentLibraryForm</Display>
-  <Edit>DocumentLibraryForm</Edit>
-  <New>DocumentLibraryForm</New>
-</FormTemplates>
-</file>
-
 <file path=customXml/item3.xml><?xml version="1.0" encoding="utf-8"?>
 <p:properties xmlns:p="http://schemas.microsoft.com/office/2006/metadata/properties" xmlns:xsi="http://www.w3.org/2001/XMLSchema-instance" xmlns:pc="http://schemas.microsoft.com/office/infopath/2007/PartnerControls">
   <documentManagement>
@@ -16419,16 +16423,45 @@
 </p:properties>
 </file>
 
-<file path=customXml/itemProps13.xml><?xml version="1.0" encoding="utf-8"?>
-<ds:datastoreItem xmlns:ds="http://schemas.openxmlformats.org/officeDocument/2006/customXml" ds:itemID="{0BEFF82A-2FA9-4126-8B42-749013CDACB8}"/>
+<file path=customXml/itemProps1.xml><?xml version="1.0" encoding="utf-8"?>
+<ds:datastoreItem xmlns:ds="http://schemas.openxmlformats.org/officeDocument/2006/customXml" ds:itemID="{1E9A1E4C-8388-4821-B0C4-BDD29A5F03A7}">
+  <ds:schemaRefs>
+    <ds:schemaRef ds:uri="http://schemas.microsoft.com/sharepoint/v3/contenttype/forms"/>
+  </ds:schemaRefs>
+</ds:datastoreItem>
 </file>
 
-<file path=customXml/itemProps22.xml><?xml version="1.0" encoding="utf-8"?>
-<ds:datastoreItem xmlns:ds="http://schemas.openxmlformats.org/officeDocument/2006/customXml" ds:itemID="{1E9A1E4C-8388-4821-B0C4-BDD29A5F03A7}"/>
+<file path=customXml/itemProps2.xml><?xml version="1.0" encoding="utf-8"?>
+<ds:datastoreItem xmlns:ds="http://schemas.openxmlformats.org/officeDocument/2006/customXml" ds:itemID="{0BEFF82A-2FA9-4126-8B42-749013CDACB8}">
+  <ds:schemaRefs>
+    <ds:schemaRef ds:uri="http://schemas.microsoft.com/office/2006/metadata/contentType"/>
+    <ds:schemaRef ds:uri="http://schemas.microsoft.com/office/2006/metadata/properties/metaAttributes"/>
+    <ds:schemaRef ds:uri="http://www.w3.org/2001/XMLSchema"/>
+    <ds:schemaRef ds:uri="http://schemas.microsoft.com/office/2006/metadata/properties"/>
+    <ds:schemaRef ds:uri="http://schemas.microsoft.com/sharepoint/v3"/>
+    <ds:schemaRef ds:uri="71af3243-3dd4-4a8d-8c0d-dd76da1f02a5"/>
+    <ds:schemaRef ds:uri="16c05727-aa75-4e4a-9b5f-8a80a1165891"/>
+    <ds:schemaRef ds:uri="230e9df3-be65-4c73-a93b-d1236ebd677e"/>
+    <ds:schemaRef ds:uri="http://schemas.microsoft.com/office/2006/documentManagement/types"/>
+    <ds:schemaRef ds:uri="http://schemas.microsoft.com/office/infopath/2007/PartnerControls"/>
+    <ds:schemaRef ds:uri="http://schemas.openxmlformats.org/package/2006/metadata/core-properties"/>
+    <ds:schemaRef ds:uri="http://purl.org/dc/elements/1.1/"/>
+    <ds:schemaRef ds:uri="http://purl.org/dc/terms/"/>
+    <ds:schemaRef ds:uri="http://schemas.microsoft.com/internal/obd"/>
+  </ds:schemaRefs>
+</ds:datastoreItem>
 </file>
 
-<file path=customXml/itemProps31.xml><?xml version="1.0" encoding="utf-8"?>
-<ds:datastoreItem xmlns:ds="http://schemas.openxmlformats.org/officeDocument/2006/customXml" ds:itemID="{33A6A2B0-0AA5-4A3C-A463-A9815E212A83}"/>
+<file path=customXml/itemProps3.xml><?xml version="1.0" encoding="utf-8"?>
+<ds:datastoreItem xmlns:ds="http://schemas.openxmlformats.org/officeDocument/2006/customXml" ds:itemID="{33A6A2B0-0AA5-4A3C-A463-A9815E212A83}">
+  <ds:schemaRefs>
+    <ds:schemaRef ds:uri="http://schemas.microsoft.com/office/2006/metadata/properties"/>
+    <ds:schemaRef ds:uri="http://schemas.microsoft.com/office/infopath/2007/PartnerControls"/>
+    <ds:schemaRef ds:uri="71af3243-3dd4-4a8d-8c0d-dd76da1f02a5"/>
+    <ds:schemaRef ds:uri="http://schemas.microsoft.com/sharepoint/v3"/>
+    <ds:schemaRef ds:uri="230e9df3-be65-4c73-a93b-d1236ebd677e"/>
+  </ds:schemaRefs>
+</ds:datastoreItem>
 </file>
 
 <file path=docMetadata/LabelInfo.xml><?xml version="1.0" encoding="utf-8"?>

</xml_diff>